<commit_message>
Python Cloud IoT Aula 10 e Aula 11 10maio2023
</commit_message>
<xml_diff>
--- a/01 Classes/Aula 10 - Aplicação Cloud Indústria 40 Python Integração Cloud Big Data Parte 1.pptx
+++ b/01 Classes/Aula 10 - Aplicação Cloud Indústria 40 Python Integração Cloud Big Data Parte 1.pptx
@@ -5,7 +5,7 @@
     <p:sldMasterId id="2147483648" r:id="rId1"/>
   </p:sldMasterIdLst>
   <p:notesMasterIdLst>
-    <p:notesMasterId r:id="rId23"/>
+    <p:notesMasterId r:id="rId26"/>
   </p:notesMasterIdLst>
   <p:sldIdLst>
     <p:sldId id="256" r:id="rId2"/>
@@ -24,11 +24,14 @@
     <p:sldId id="356" r:id="rId15"/>
     <p:sldId id="357" r:id="rId16"/>
     <p:sldId id="358" r:id="rId17"/>
-    <p:sldId id="333" r:id="rId18"/>
-    <p:sldId id="323" r:id="rId19"/>
-    <p:sldId id="345" r:id="rId20"/>
-    <p:sldId id="337" r:id="rId21"/>
-    <p:sldId id="309" r:id="rId22"/>
+    <p:sldId id="359" r:id="rId18"/>
+    <p:sldId id="333" r:id="rId19"/>
+    <p:sldId id="323" r:id="rId20"/>
+    <p:sldId id="345" r:id="rId21"/>
+    <p:sldId id="360" r:id="rId22"/>
+    <p:sldId id="361" r:id="rId23"/>
+    <p:sldId id="337" r:id="rId24"/>
+    <p:sldId id="309" r:id="rId25"/>
   </p:sldIdLst>
   <p:sldSz cx="9144000" cy="5143500" type="screen16x9"/>
   <p:notesSz cx="6858000" cy="9144000"/>
@@ -1027,7 +1030,7 @@
     </p:spTree>
     <p:extLst>
       <p:ext uri="{BB962C8B-B14F-4D97-AF65-F5344CB8AC3E}">
-        <p14:creationId xmlns:p14="http://schemas.microsoft.com/office/powerpoint/2010/main" val="585304384"/>
+        <p14:creationId xmlns:p14="http://schemas.microsoft.com/office/powerpoint/2010/main" val="2830119852"/>
       </p:ext>
     </p:extLst>
   </p:cSld>
@@ -1093,7 +1096,7 @@
     </p:spTree>
     <p:extLst>
       <p:ext uri="{BB962C8B-B14F-4D97-AF65-F5344CB8AC3E}">
-        <p14:creationId xmlns:p14="http://schemas.microsoft.com/office/powerpoint/2010/main" val="2709569597"/>
+        <p14:creationId xmlns:p14="http://schemas.microsoft.com/office/powerpoint/2010/main" val="585304384"/>
       </p:ext>
     </p:extLst>
   </p:cSld>
@@ -1159,7 +1162,7 @@
     </p:spTree>
     <p:extLst>
       <p:ext uri="{BB962C8B-B14F-4D97-AF65-F5344CB8AC3E}">
-        <p14:creationId xmlns:p14="http://schemas.microsoft.com/office/powerpoint/2010/main" val="3863516043"/>
+        <p14:creationId xmlns:p14="http://schemas.microsoft.com/office/powerpoint/2010/main" val="2709569597"/>
       </p:ext>
     </p:extLst>
   </p:cSld>
@@ -1225,7 +1228,7 @@
     </p:spTree>
     <p:extLst>
       <p:ext uri="{BB962C8B-B14F-4D97-AF65-F5344CB8AC3E}">
-        <p14:creationId xmlns:p14="http://schemas.microsoft.com/office/powerpoint/2010/main" val="4290351292"/>
+        <p14:creationId xmlns:p14="http://schemas.microsoft.com/office/powerpoint/2010/main" val="3863516043"/>
       </p:ext>
     </p:extLst>
   </p:cSld>
@@ -1292,6 +1295,204 @@
     <p:extLst>
       <p:ext uri="{BB962C8B-B14F-4D97-AF65-F5344CB8AC3E}">
         <p14:creationId xmlns:p14="http://schemas.microsoft.com/office/powerpoint/2010/main" val="2948490523"/>
+      </p:ext>
+    </p:extLst>
+  </p:cSld>
+  <p:clrMapOvr>
+    <a:masterClrMapping/>
+  </p:clrMapOvr>
+</p:notes>
+</file>
+
+<file path=ppt/notesSlides/notesSlide20.xml><?xml version="1.0" encoding="utf-8"?>
+<p:notes xmlns:a="http://schemas.openxmlformats.org/drawingml/2006/main" xmlns:r="http://schemas.openxmlformats.org/officeDocument/2006/relationships" xmlns:p="http://schemas.openxmlformats.org/presentationml/2006/main">
+  <p:cSld>
+    <p:spTree>
+      <p:nvGrpSpPr>
+        <p:cNvPr id="1" name=""/>
+        <p:cNvGrpSpPr/>
+        <p:nvPr/>
+      </p:nvGrpSpPr>
+      <p:grpSpPr>
+        <a:xfrm>
+          <a:off x="0" y="0"/>
+          <a:ext cx="0" cy="0"/>
+          <a:chOff x="0" y="0"/>
+          <a:chExt cx="0" cy="0"/>
+        </a:xfrm>
+      </p:grpSpPr>
+      <p:sp>
+        <p:nvSpPr>
+          <p:cNvPr id="2" name="Espaço Reservado para Imagem de Slide 1"/>
+          <p:cNvSpPr>
+            <a:spLocks noGrp="1" noRot="1" noChangeAspect="1"/>
+          </p:cNvSpPr>
+          <p:nvPr>
+            <p:ph type="sldImg"/>
+          </p:nvPr>
+        </p:nvSpPr>
+        <p:spPr>
+          <a:xfrm>
+            <a:off x="381000" y="685800"/>
+            <a:ext cx="6096000" cy="3429000"/>
+          </a:xfrm>
+        </p:spPr>
+      </p:sp>
+      <p:sp>
+        <p:nvSpPr>
+          <p:cNvPr id="3" name="Espaço Reservado para Anotações 2"/>
+          <p:cNvSpPr>
+            <a:spLocks noGrp="1"/>
+          </p:cNvSpPr>
+          <p:nvPr>
+            <p:ph type="body" idx="1"/>
+          </p:nvPr>
+        </p:nvSpPr>
+        <p:spPr/>
+        <p:txBody>
+          <a:bodyPr/>
+          <a:lstStyle/>
+          <a:p>
+            <a:endParaRPr lang="pt-BR" dirty="0"/>
+          </a:p>
+        </p:txBody>
+      </p:sp>
+    </p:spTree>
+    <p:extLst>
+      <p:ext uri="{BB962C8B-B14F-4D97-AF65-F5344CB8AC3E}">
+        <p14:creationId xmlns:p14="http://schemas.microsoft.com/office/powerpoint/2010/main" val="1756347281"/>
+      </p:ext>
+    </p:extLst>
+  </p:cSld>
+  <p:clrMapOvr>
+    <a:masterClrMapping/>
+  </p:clrMapOvr>
+</p:notes>
+</file>
+
+<file path=ppt/notesSlides/notesSlide21.xml><?xml version="1.0" encoding="utf-8"?>
+<p:notes xmlns:a="http://schemas.openxmlformats.org/drawingml/2006/main" xmlns:r="http://schemas.openxmlformats.org/officeDocument/2006/relationships" xmlns:p="http://schemas.openxmlformats.org/presentationml/2006/main">
+  <p:cSld>
+    <p:spTree>
+      <p:nvGrpSpPr>
+        <p:cNvPr id="1" name=""/>
+        <p:cNvGrpSpPr/>
+        <p:nvPr/>
+      </p:nvGrpSpPr>
+      <p:grpSpPr>
+        <a:xfrm>
+          <a:off x="0" y="0"/>
+          <a:ext cx="0" cy="0"/>
+          <a:chOff x="0" y="0"/>
+          <a:chExt cx="0" cy="0"/>
+        </a:xfrm>
+      </p:grpSpPr>
+      <p:sp>
+        <p:nvSpPr>
+          <p:cNvPr id="2" name="Espaço Reservado para Imagem de Slide 1"/>
+          <p:cNvSpPr>
+            <a:spLocks noGrp="1" noRot="1" noChangeAspect="1"/>
+          </p:cNvSpPr>
+          <p:nvPr>
+            <p:ph type="sldImg"/>
+          </p:nvPr>
+        </p:nvSpPr>
+        <p:spPr>
+          <a:xfrm>
+            <a:off x="381000" y="685800"/>
+            <a:ext cx="6096000" cy="3429000"/>
+          </a:xfrm>
+        </p:spPr>
+      </p:sp>
+      <p:sp>
+        <p:nvSpPr>
+          <p:cNvPr id="3" name="Espaço Reservado para Anotações 2"/>
+          <p:cNvSpPr>
+            <a:spLocks noGrp="1"/>
+          </p:cNvSpPr>
+          <p:nvPr>
+            <p:ph type="body" idx="1"/>
+          </p:nvPr>
+        </p:nvSpPr>
+        <p:spPr/>
+        <p:txBody>
+          <a:bodyPr/>
+          <a:lstStyle/>
+          <a:p>
+            <a:endParaRPr lang="pt-BR" dirty="0"/>
+          </a:p>
+        </p:txBody>
+      </p:sp>
+    </p:spTree>
+    <p:extLst>
+      <p:ext uri="{BB962C8B-B14F-4D97-AF65-F5344CB8AC3E}">
+        <p14:creationId xmlns:p14="http://schemas.microsoft.com/office/powerpoint/2010/main" val="3768960452"/>
+      </p:ext>
+    </p:extLst>
+  </p:cSld>
+  <p:clrMapOvr>
+    <a:masterClrMapping/>
+  </p:clrMapOvr>
+</p:notes>
+</file>
+
+<file path=ppt/notesSlides/notesSlide22.xml><?xml version="1.0" encoding="utf-8"?>
+<p:notes xmlns:a="http://schemas.openxmlformats.org/drawingml/2006/main" xmlns:r="http://schemas.openxmlformats.org/officeDocument/2006/relationships" xmlns:p="http://schemas.openxmlformats.org/presentationml/2006/main">
+  <p:cSld>
+    <p:spTree>
+      <p:nvGrpSpPr>
+        <p:cNvPr id="1" name=""/>
+        <p:cNvGrpSpPr/>
+        <p:nvPr/>
+      </p:nvGrpSpPr>
+      <p:grpSpPr>
+        <a:xfrm>
+          <a:off x="0" y="0"/>
+          <a:ext cx="0" cy="0"/>
+          <a:chOff x="0" y="0"/>
+          <a:chExt cx="0" cy="0"/>
+        </a:xfrm>
+      </p:grpSpPr>
+      <p:sp>
+        <p:nvSpPr>
+          <p:cNvPr id="2" name="Espaço Reservado para Imagem de Slide 1"/>
+          <p:cNvSpPr>
+            <a:spLocks noGrp="1" noRot="1" noChangeAspect="1"/>
+          </p:cNvSpPr>
+          <p:nvPr>
+            <p:ph type="sldImg"/>
+          </p:nvPr>
+        </p:nvSpPr>
+        <p:spPr>
+          <a:xfrm>
+            <a:off x="381000" y="685800"/>
+            <a:ext cx="6096000" cy="3429000"/>
+          </a:xfrm>
+        </p:spPr>
+      </p:sp>
+      <p:sp>
+        <p:nvSpPr>
+          <p:cNvPr id="3" name="Espaço Reservado para Anotações 2"/>
+          <p:cNvSpPr>
+            <a:spLocks noGrp="1"/>
+          </p:cNvSpPr>
+          <p:nvPr>
+            <p:ph type="body" idx="1"/>
+          </p:nvPr>
+        </p:nvSpPr>
+        <p:spPr/>
+        <p:txBody>
+          <a:bodyPr/>
+          <a:lstStyle/>
+          <a:p>
+            <a:endParaRPr lang="pt-BR" dirty="0"/>
+          </a:p>
+        </p:txBody>
+      </p:sp>
+    </p:spTree>
+    <p:extLst>
+      <p:ext uri="{BB962C8B-B14F-4D97-AF65-F5344CB8AC3E}">
+        <p14:creationId xmlns:p14="http://schemas.microsoft.com/office/powerpoint/2010/main" val="4290351292"/>
       </p:ext>
     </p:extLst>
   </p:cSld>
@@ -7107,6 +7308,12 @@
               </a:rPr>
               <a:t> – Escola de Tecnologia, Experiência e Futuro</a:t>
             </a:r>
+          </a:p>
+          <a:p>
+            <a:pPr algn="just">
+              <a:buFont typeface="Wingdings" panose="05000000000000000000" pitchFamily="2" charset="2"/>
+              <a:buChar char="§"/>
+            </a:pPr>
             <a:endParaRPr lang="pt-BR" sz="2000" dirty="0">
               <a:solidFill>
                 <a:schemeClr val="tx1"/>
@@ -7171,28 +7378,12 @@
           <a:lstStyle/>
           <a:p>
             <a:r>
-              <a:rPr lang="en-US" b="1" dirty="0" err="1">
+              <a:rPr lang="pt-BR" b="1" dirty="0">
                 <a:solidFill>
                   <a:srgbClr val="0070C0"/>
                 </a:solidFill>
               </a:rPr>
-              <a:t>Leitura</a:t>
-            </a:r>
-            <a:r>
-              <a:rPr lang="en-US" b="1" dirty="0">
-                <a:solidFill>
-                  <a:srgbClr val="0070C0"/>
-                </a:solidFill>
-              </a:rPr>
-              <a:t> </a:t>
-            </a:r>
-            <a:r>
-              <a:rPr lang="en-US" b="1" dirty="0" err="1">
-                <a:solidFill>
-                  <a:srgbClr val="0070C0"/>
-                </a:solidFill>
-              </a:rPr>
-              <a:t>Específica</a:t>
+              <a:t>Outros Python com Big Data</a:t>
             </a:r>
             <a:endParaRPr lang="en-US" b="1" dirty="0">
               <a:solidFill>
@@ -7214,8 +7405,8 @@
         </p:nvSpPr>
         <p:spPr>
           <a:xfrm>
-            <a:off x="142865" y="1200151"/>
-            <a:ext cx="8865056" cy="3394472"/>
+            <a:off x="142865" y="1200150"/>
+            <a:ext cx="8865056" cy="3737370"/>
           </a:xfrm>
         </p:spPr>
         <p:txBody>
@@ -7228,62 +7419,64 @@
               <a:buNone/>
             </a:pPr>
             <a:r>
-              <a:rPr lang="pt-BR" sz="2000" dirty="0">
-                <a:latin typeface="Times New Roman" panose="02020603050405020304" pitchFamily="18" charset="0"/>
-                <a:cs typeface="Times New Roman" panose="02020603050405020304" pitchFamily="18" charset="0"/>
-              </a:rPr>
-              <a:t>[1] </a:t>
-            </a:r>
-            <a:r>
               <a:rPr lang="pt-BR" sz="2000" b="1" dirty="0">
-                <a:latin typeface="Times New Roman" panose="02020603050405020304" pitchFamily="18" charset="0"/>
-                <a:cs typeface="Times New Roman" panose="02020603050405020304" pitchFamily="18" charset="0"/>
-              </a:rPr>
-              <a:t>Python para Data Science</a:t>
-            </a:r>
-            <a:r>
-              <a:rPr lang="pt-BR" sz="2000" dirty="0">
-                <a:latin typeface="Times New Roman" panose="02020603050405020304" pitchFamily="18" charset="0"/>
-                <a:cs typeface="Times New Roman" panose="02020603050405020304" pitchFamily="18" charset="0"/>
-              </a:rPr>
-              <a:t>.</a:t>
+                <a:solidFill>
+                  <a:schemeClr val="tx1"/>
+                </a:solidFill>
+                <a:latin typeface="Times New Roman" panose="02020603050405020304" pitchFamily="18" charset="0"/>
+                <a:cs typeface="Times New Roman" panose="02020603050405020304" pitchFamily="18" charset="0"/>
+              </a:rPr>
+              <a:t>Pacotes Python</a:t>
+            </a:r>
+            <a:r>
+              <a:rPr lang="pt-BR" sz="2000" dirty="0">
+                <a:solidFill>
+                  <a:schemeClr val="tx1"/>
+                </a:solidFill>
+                <a:latin typeface="Times New Roman" panose="02020603050405020304" pitchFamily="18" charset="0"/>
+                <a:cs typeface="Times New Roman" panose="02020603050405020304" pitchFamily="18" charset="0"/>
+              </a:rPr>
+              <a:t> – </a:t>
+            </a:r>
+            <a:r>
+              <a:rPr lang="pt-BR" sz="2000" b="1" dirty="0">
+                <a:solidFill>
+                  <a:schemeClr val="tx1"/>
+                </a:solidFill>
+                <a:latin typeface="Times New Roman" panose="02020603050405020304" pitchFamily="18" charset="0"/>
+                <a:cs typeface="Times New Roman" panose="02020603050405020304" pitchFamily="18" charset="0"/>
+              </a:rPr>
+              <a:t>Data Science (</a:t>
+            </a:r>
+            <a:r>
+              <a:rPr lang="pt-BR" sz="2000" b="1" dirty="0">
+                <a:solidFill>
+                  <a:srgbClr val="FF0000"/>
+                </a:solidFill>
+                <a:latin typeface="Times New Roman" panose="02020603050405020304" pitchFamily="18" charset="0"/>
+                <a:cs typeface="Times New Roman" panose="02020603050405020304" pitchFamily="18" charset="0"/>
+              </a:rPr>
+              <a:t>Recursos Computacionais</a:t>
+            </a:r>
+            <a:r>
+              <a:rPr lang="pt-BR" sz="2000" b="1" dirty="0">
+                <a:solidFill>
+                  <a:schemeClr val="tx1"/>
+                </a:solidFill>
+                <a:latin typeface="Times New Roman" panose="02020603050405020304" pitchFamily="18" charset="0"/>
+                <a:cs typeface="Times New Roman" panose="02020603050405020304" pitchFamily="18" charset="0"/>
+              </a:rPr>
+              <a:t>)</a:t>
             </a:r>
           </a:p>
           <a:p>
             <a:pPr marL="0" indent="0" algn="just">
               <a:buNone/>
             </a:pPr>
-            <a:r>
-              <a:rPr lang="pt-BR" sz="2000" b="1" dirty="0">
-                <a:solidFill>
-                  <a:srgbClr val="FF0000"/>
-                </a:solidFill>
-                <a:latin typeface="Times New Roman" panose="02020603050405020304" pitchFamily="18" charset="0"/>
-                <a:cs typeface="Times New Roman" panose="02020603050405020304" pitchFamily="18" charset="0"/>
-              </a:rPr>
-              <a:t>Disponível em: </a:t>
-            </a:r>
-            <a:r>
-              <a:rPr lang="pt-BR" sz="2000" dirty="0">
-                <a:latin typeface="Times New Roman" panose="02020603050405020304" pitchFamily="18" charset="0"/>
-                <a:cs typeface="Times New Roman" panose="02020603050405020304" pitchFamily="18" charset="0"/>
-                <a:hlinkClick r:id="rId3"/>
-              </a:rPr>
-              <a:t>https://coodesh.com/blog/carreiras/python-para-data-science-a-linguagem-mais-utilizada-na-area/</a:t>
-            </a:r>
-            <a:r>
-              <a:rPr lang="pt-BR" sz="2000" dirty="0">
-                <a:latin typeface="Times New Roman" panose="02020603050405020304" pitchFamily="18" charset="0"/>
-                <a:cs typeface="Times New Roman" panose="02020603050405020304" pitchFamily="18" charset="0"/>
-              </a:rPr>
-              <a:t> </a:t>
-            </a:r>
-          </a:p>
-          <a:p>
-            <a:pPr marL="0" indent="0" algn="just">
-              <a:buNone/>
-            </a:pPr>
-            <a:endParaRPr lang="pt-BR" sz="2000" dirty="0">
+            <a:endParaRPr lang="pt-BR" sz="2000" b="1" dirty="0">
+              <a:solidFill>
+                <a:schemeClr val="tx1"/>
+              </a:solidFill>
               <a:latin typeface="Times New Roman" panose="02020603050405020304" pitchFamily="18" charset="0"/>
               <a:cs typeface="Times New Roman" panose="02020603050405020304" pitchFamily="18" charset="0"/>
             </a:endParaRPr>
@@ -7292,7 +7485,46 @@
             <a:pPr marL="0" indent="0" algn="just">
               <a:buNone/>
             </a:pPr>
-            <a:endParaRPr lang="pt-BR" sz="2000" dirty="0">
+            <a:r>
+              <a:rPr lang="pt-BR" sz="2000" dirty="0">
+                <a:solidFill>
+                  <a:schemeClr val="tx1"/>
+                </a:solidFill>
+                <a:latin typeface="Times New Roman" panose="02020603050405020304" pitchFamily="18" charset="0"/>
+                <a:cs typeface="Times New Roman" panose="02020603050405020304" pitchFamily="18" charset="0"/>
+              </a:rPr>
+              <a:t>	</a:t>
+            </a:r>
+            <a:r>
+              <a:rPr lang="pt-BR" sz="2000" dirty="0">
+                <a:solidFill>
+                  <a:schemeClr val="tx1"/>
+                </a:solidFill>
+                <a:latin typeface="Times New Roman" panose="02020603050405020304" pitchFamily="18" charset="0"/>
+                <a:cs typeface="Times New Roman" panose="02020603050405020304" pitchFamily="18" charset="0"/>
+                <a:hlinkClick r:id="rId3"/>
+              </a:rPr>
+              <a:t>https://blog.dsacademy.com.br/5-pacotes-python-que-todo-cientista-de-dados-deve-conhecer/</a:t>
+            </a:r>
+            <a:r>
+              <a:rPr lang="pt-BR" sz="2000" dirty="0">
+                <a:solidFill>
+                  <a:schemeClr val="tx1"/>
+                </a:solidFill>
+                <a:latin typeface="Times New Roman" panose="02020603050405020304" pitchFamily="18" charset="0"/>
+                <a:cs typeface="Times New Roman" panose="02020603050405020304" pitchFamily="18" charset="0"/>
+              </a:rPr>
+              <a:t> </a:t>
+            </a:r>
+          </a:p>
+          <a:p>
+            <a:pPr marL="0" indent="0" algn="just">
+              <a:buNone/>
+            </a:pPr>
+            <a:endParaRPr lang="pt-BR" sz="2000" b="1" dirty="0">
+              <a:solidFill>
+                <a:schemeClr val="tx1"/>
+              </a:solidFill>
               <a:latin typeface="Times New Roman" panose="02020603050405020304" pitchFamily="18" charset="0"/>
               <a:cs typeface="Times New Roman" panose="02020603050405020304" pitchFamily="18" charset="0"/>
             </a:endParaRPr>
@@ -7302,62 +7534,44 @@
               <a:buNone/>
             </a:pPr>
             <a:r>
-              <a:rPr lang="pt-BR" sz="2000" dirty="0">
-                <a:latin typeface="Times New Roman" panose="02020603050405020304" pitchFamily="18" charset="0"/>
-                <a:cs typeface="Times New Roman" panose="02020603050405020304" pitchFamily="18" charset="0"/>
-              </a:rPr>
-              <a:t>[2] </a:t>
-            </a:r>
-            <a:r>
-              <a:rPr lang="en-US" sz="2000" b="1" dirty="0">
-                <a:latin typeface="Times New Roman" panose="02020603050405020304" pitchFamily="18" charset="0"/>
-                <a:cs typeface="Times New Roman" panose="02020603050405020304" pitchFamily="18" charset="0"/>
-              </a:rPr>
-              <a:t>Using Python for Big Data &amp; Analytics (Python is Perfect for Big Data)</a:t>
-            </a:r>
-            <a:r>
-              <a:rPr lang="pt-BR" sz="2000" dirty="0">
-                <a:latin typeface="Times New Roman" panose="02020603050405020304" pitchFamily="18" charset="0"/>
-                <a:cs typeface="Times New Roman" panose="02020603050405020304" pitchFamily="18" charset="0"/>
-              </a:rPr>
-              <a:t>. </a:t>
+              <a:rPr lang="pt-BR" sz="2000" b="1" dirty="0">
+                <a:solidFill>
+                  <a:schemeClr val="tx1"/>
+                </a:solidFill>
+                <a:latin typeface="Times New Roman" panose="02020603050405020304" pitchFamily="18" charset="0"/>
+                <a:cs typeface="Times New Roman" panose="02020603050405020304" pitchFamily="18" charset="0"/>
+              </a:rPr>
+              <a:t>Bibliotecas Python</a:t>
+            </a:r>
+            <a:r>
+              <a:rPr lang="pt-BR" sz="2000" dirty="0">
+                <a:solidFill>
+                  <a:schemeClr val="tx1"/>
+                </a:solidFill>
+                <a:latin typeface="Times New Roman" panose="02020603050405020304" pitchFamily="18" charset="0"/>
+                <a:cs typeface="Times New Roman" panose="02020603050405020304" pitchFamily="18" charset="0"/>
+              </a:rPr>
+              <a:t> – </a:t>
+            </a:r>
+            <a:r>
+              <a:rPr lang="pt-BR" sz="2000" b="1" dirty="0">
+                <a:solidFill>
+                  <a:schemeClr val="tx1"/>
+                </a:solidFill>
+                <a:latin typeface="Times New Roman" panose="02020603050405020304" pitchFamily="18" charset="0"/>
+                <a:cs typeface="Times New Roman" panose="02020603050405020304" pitchFamily="18" charset="0"/>
+              </a:rPr>
+              <a:t>Data Science</a:t>
             </a:r>
           </a:p>
           <a:p>
             <a:pPr marL="0" indent="0" algn="just">
               <a:buNone/>
             </a:pPr>
-            <a:r>
-              <a:rPr lang="pt-BR" sz="2000" b="1" dirty="0">
-                <a:solidFill>
-                  <a:srgbClr val="FF0000"/>
-                </a:solidFill>
-                <a:latin typeface="Times New Roman" panose="02020603050405020304" pitchFamily="18" charset="0"/>
-                <a:cs typeface="Times New Roman" panose="02020603050405020304" pitchFamily="18" charset="0"/>
-              </a:rPr>
-              <a:t>Disponível em: </a:t>
-            </a:r>
-            <a:r>
-              <a:rPr lang="pt-BR" sz="2000" dirty="0">
-                <a:latin typeface="Times New Roman" panose="02020603050405020304" pitchFamily="18" charset="0"/>
-                <a:cs typeface="Times New Roman" panose="02020603050405020304" pitchFamily="18" charset="0"/>
-                <a:hlinkClick r:id="rId4"/>
-              </a:rPr>
-              <a:t>https://www.bmc.com/blogs/python-big-data-analytics/</a:t>
-            </a:r>
-            <a:r>
-              <a:rPr lang="pt-BR" sz="2000" dirty="0">
-                <a:latin typeface="Times New Roman" panose="02020603050405020304" pitchFamily="18" charset="0"/>
-                <a:cs typeface="Times New Roman" panose="02020603050405020304" pitchFamily="18" charset="0"/>
-              </a:rPr>
-              <a:t> </a:t>
-            </a:r>
-          </a:p>
-          <a:p>
-            <a:pPr marL="0" indent="0" algn="just">
-              <a:buNone/>
-            </a:pPr>
             <a:endParaRPr lang="pt-BR" sz="2000" dirty="0">
+              <a:solidFill>
+                <a:schemeClr val="tx1"/>
+              </a:solidFill>
               <a:latin typeface="Times New Roman" panose="02020603050405020304" pitchFamily="18" charset="0"/>
               <a:cs typeface="Times New Roman" panose="02020603050405020304" pitchFamily="18" charset="0"/>
             </a:endParaRPr>
@@ -7366,34 +7580,44 @@
             <a:pPr marL="0" indent="0" algn="just">
               <a:buNone/>
             </a:pPr>
-            <a:endParaRPr lang="pt-BR" sz="2000" dirty="0">
-              <a:latin typeface="Times New Roman" panose="02020603050405020304" pitchFamily="18" charset="0"/>
-              <a:cs typeface="Times New Roman" panose="02020603050405020304" pitchFamily="18" charset="0"/>
-            </a:endParaRPr>
-          </a:p>
-          <a:p>
-            <a:pPr marL="0" indent="0" algn="just">
-              <a:buNone/>
-            </a:pPr>
-            <a:endParaRPr lang="pt-BR" sz="2000" dirty="0">
-              <a:latin typeface="Times New Roman" panose="02020603050405020304" pitchFamily="18" charset="0"/>
-              <a:cs typeface="Times New Roman" panose="02020603050405020304" pitchFamily="18" charset="0"/>
-            </a:endParaRPr>
-          </a:p>
-          <a:p>
-            <a:pPr marL="0" indent="0" algn="just">
-              <a:buNone/>
-            </a:pPr>
-            <a:endParaRPr lang="pt-BR" sz="2000" dirty="0">
-              <a:latin typeface="Calibri" panose="020F0502020204030204" pitchFamily="34" charset="0"/>
-            </a:endParaRPr>
+            <a:r>
+              <a:rPr lang="pt-BR" sz="2000" dirty="0">
+                <a:solidFill>
+                  <a:schemeClr val="tx1"/>
+                </a:solidFill>
+                <a:latin typeface="Times New Roman" panose="02020603050405020304" pitchFamily="18" charset="0"/>
+                <a:cs typeface="Times New Roman" panose="02020603050405020304" pitchFamily="18" charset="0"/>
+              </a:rPr>
+              <a:t>	</a:t>
+            </a:r>
+            <a:r>
+              <a:rPr lang="pt-BR" sz="2000" dirty="0">
+                <a:solidFill>
+                  <a:schemeClr val="tx1"/>
+                </a:solidFill>
+                <a:latin typeface="Times New Roman" panose="02020603050405020304" pitchFamily="18" charset="0"/>
+                <a:cs typeface="Times New Roman" panose="02020603050405020304" pitchFamily="18" charset="0"/>
+                <a:hlinkClick r:id="rId4"/>
+              </a:rPr>
+              <a:t>https://blog.dsacademy.com.br/top-25-bibliotecas-python-para-data_science/</a:t>
+            </a:r>
+            <a:r>
+              <a:rPr lang="pt-BR" sz="2000" dirty="0">
+                <a:solidFill>
+                  <a:schemeClr val="tx1"/>
+                </a:solidFill>
+                <a:latin typeface="Times New Roman" panose="02020603050405020304" pitchFamily="18" charset="0"/>
+                <a:cs typeface="Times New Roman" panose="02020603050405020304" pitchFamily="18" charset="0"/>
+              </a:rPr>
+              <a:t> </a:t>
+            </a:r>
           </a:p>
         </p:txBody>
       </p:sp>
     </p:spTree>
     <p:extLst>
       <p:ext uri="{BB962C8B-B14F-4D97-AF65-F5344CB8AC3E}">
-        <p14:creationId xmlns:p14="http://schemas.microsoft.com/office/powerpoint/2010/main" val="3680270425"/>
+        <p14:creationId xmlns:p14="http://schemas.microsoft.com/office/powerpoint/2010/main" val="2102469222"/>
       </p:ext>
     </p:extLst>
   </p:cSld>
@@ -7449,7 +7673,7 @@
                   <a:srgbClr val="0070C0"/>
                 </a:solidFill>
               </a:rPr>
-              <a:t>Aprenda</a:t>
+              <a:t>Leitura</a:t>
             </a:r>
             <a:r>
               <a:rPr lang="en-US" b="1" dirty="0">
@@ -7457,8 +7681,21 @@
                   <a:srgbClr val="0070C0"/>
                 </a:solidFill>
               </a:rPr>
-              <a:t>+</a:t>
-            </a:r>
+              <a:t> </a:t>
+            </a:r>
+            <a:r>
+              <a:rPr lang="en-US" b="1" dirty="0" err="1">
+                <a:solidFill>
+                  <a:srgbClr val="0070C0"/>
+                </a:solidFill>
+              </a:rPr>
+              <a:t>Específica</a:t>
+            </a:r>
+            <a:endParaRPr lang="en-US" b="1" dirty="0">
+              <a:solidFill>
+                <a:srgbClr val="0070C0"/>
+              </a:solidFill>
+            </a:endParaRPr>
           </a:p>
         </p:txBody>
       </p:sp>
@@ -7474,8 +7711,8 @@
         </p:nvSpPr>
         <p:spPr>
           <a:xfrm>
-            <a:off x="142865" y="1200150"/>
-            <a:ext cx="8865056" cy="3737370"/>
+            <a:off x="142865" y="1200151"/>
+            <a:ext cx="8865056" cy="3394472"/>
           </a:xfrm>
         </p:spPr>
         <p:txBody>
@@ -7495,11 +7732,11 @@
               <a:t>[1] </a:t>
             </a:r>
             <a:r>
-              <a:rPr lang="en-US" sz="2000" b="1" dirty="0">
-                <a:latin typeface="Times New Roman" panose="02020603050405020304" pitchFamily="18" charset="0"/>
-                <a:cs typeface="Times New Roman" panose="02020603050405020304" pitchFamily="18" charset="0"/>
-              </a:rPr>
-              <a:t>Big Data Analytics Using Python | Python Big Data</a:t>
+              <a:rPr lang="pt-BR" sz="2000" b="1" dirty="0">
+                <a:latin typeface="Times New Roman" panose="02020603050405020304" pitchFamily="18" charset="0"/>
+                <a:cs typeface="Times New Roman" panose="02020603050405020304" pitchFamily="18" charset="0"/>
+              </a:rPr>
+              <a:t>Python para Data Science</a:t>
             </a:r>
             <a:r>
               <a:rPr lang="pt-BR" sz="2000" dirty="0">
@@ -7529,7 +7766,7 @@
                 <a:cs typeface="Times New Roman" panose="02020603050405020304" pitchFamily="18" charset="0"/>
                 <a:hlinkClick r:id="rId3"/>
               </a:rPr>
-              <a:t>https://youtu.be/cUw3DsDpQCE</a:t>
+              <a:t>https://coodesh.com/blog/carreiras/python-para-data-science-a-linguagem-mais-utilizada-na-area/</a:t>
             </a:r>
             <a:r>
               <a:rPr lang="pt-BR" sz="2000" dirty="0">
@@ -7561,6 +7798,62 @@
             <a:pPr marL="0" indent="0" algn="just">
               <a:buNone/>
             </a:pPr>
+            <a:r>
+              <a:rPr lang="pt-BR" sz="2000" dirty="0">
+                <a:latin typeface="Times New Roman" panose="02020603050405020304" pitchFamily="18" charset="0"/>
+                <a:cs typeface="Times New Roman" panose="02020603050405020304" pitchFamily="18" charset="0"/>
+              </a:rPr>
+              <a:t>[2] </a:t>
+            </a:r>
+            <a:r>
+              <a:rPr lang="en-US" sz="2000" b="1" dirty="0">
+                <a:latin typeface="Times New Roman" panose="02020603050405020304" pitchFamily="18" charset="0"/>
+                <a:cs typeface="Times New Roman" panose="02020603050405020304" pitchFamily="18" charset="0"/>
+              </a:rPr>
+              <a:t>Using Python for Big Data &amp; Analytics (Python is Perfect for Big Data)</a:t>
+            </a:r>
+            <a:r>
+              <a:rPr lang="pt-BR" sz="2000" dirty="0">
+                <a:latin typeface="Times New Roman" panose="02020603050405020304" pitchFamily="18" charset="0"/>
+                <a:cs typeface="Times New Roman" panose="02020603050405020304" pitchFamily="18" charset="0"/>
+              </a:rPr>
+              <a:t>. </a:t>
+            </a:r>
+          </a:p>
+          <a:p>
+            <a:pPr marL="0" indent="0" algn="just">
+              <a:buNone/>
+            </a:pPr>
+            <a:r>
+              <a:rPr lang="pt-BR" sz="2000" b="1" dirty="0">
+                <a:solidFill>
+                  <a:srgbClr val="FF0000"/>
+                </a:solidFill>
+                <a:latin typeface="Times New Roman" panose="02020603050405020304" pitchFamily="18" charset="0"/>
+                <a:cs typeface="Times New Roman" panose="02020603050405020304" pitchFamily="18" charset="0"/>
+              </a:rPr>
+              <a:t>Disponível em: </a:t>
+            </a:r>
+            <a:r>
+              <a:rPr lang="pt-BR" sz="2000" dirty="0">
+                <a:latin typeface="Times New Roman" panose="02020603050405020304" pitchFamily="18" charset="0"/>
+                <a:cs typeface="Times New Roman" panose="02020603050405020304" pitchFamily="18" charset="0"/>
+                <a:hlinkClick r:id="rId4"/>
+              </a:rPr>
+              <a:t>https://www.bmc.com/blogs/python-big-data-analytics/</a:t>
+            </a:r>
+            <a:r>
+              <a:rPr lang="pt-BR" sz="2000" dirty="0">
+                <a:latin typeface="Times New Roman" panose="02020603050405020304" pitchFamily="18" charset="0"/>
+                <a:cs typeface="Times New Roman" panose="02020603050405020304" pitchFamily="18" charset="0"/>
+              </a:rPr>
+              <a:t> </a:t>
+            </a:r>
+          </a:p>
+          <a:p>
+            <a:pPr marL="0" indent="0" algn="just">
+              <a:buNone/>
+            </a:pPr>
             <a:endParaRPr lang="pt-BR" sz="2000" dirty="0">
               <a:latin typeface="Times New Roman" panose="02020603050405020304" pitchFamily="18" charset="0"/>
               <a:cs typeface="Times New Roman" panose="02020603050405020304" pitchFamily="18" charset="0"/>
@@ -7570,79 +7863,26 @@
             <a:pPr marL="0" indent="0" algn="just">
               <a:buNone/>
             </a:pPr>
-            <a:r>
-              <a:rPr lang="pt-BR" sz="2000" dirty="0">
-                <a:latin typeface="Times New Roman" panose="02020603050405020304" pitchFamily="18" charset="0"/>
-                <a:cs typeface="Times New Roman" panose="02020603050405020304" pitchFamily="18" charset="0"/>
-              </a:rPr>
-              <a:t>[2] </a:t>
-            </a:r>
-            <a:r>
-              <a:rPr lang="en-US" sz="2000" b="1" dirty="0">
-                <a:latin typeface="Times New Roman" panose="02020603050405020304" pitchFamily="18" charset="0"/>
-                <a:cs typeface="Times New Roman" panose="02020603050405020304" pitchFamily="18" charset="0"/>
-              </a:rPr>
-              <a:t>Data Analysis with Python - Course (</a:t>
-            </a:r>
-            <a:r>
-              <a:rPr lang="en-US" sz="2000" b="1" dirty="0" err="1">
-                <a:latin typeface="Times New Roman" panose="02020603050405020304" pitchFamily="18" charset="0"/>
-                <a:cs typeface="Times New Roman" panose="02020603050405020304" pitchFamily="18" charset="0"/>
-              </a:rPr>
-              <a:t>Numpy</a:t>
-            </a:r>
-            <a:r>
-              <a:rPr lang="en-US" sz="2000" b="1" dirty="0">
-                <a:latin typeface="Times New Roman" panose="02020603050405020304" pitchFamily="18" charset="0"/>
-                <a:cs typeface="Times New Roman" panose="02020603050405020304" pitchFamily="18" charset="0"/>
-              </a:rPr>
-              <a:t>, Pandas, Matplotlib, Seaborn)</a:t>
-            </a:r>
-            <a:r>
-              <a:rPr lang="pt-BR" sz="2000" dirty="0">
-                <a:latin typeface="Times New Roman" panose="02020603050405020304" pitchFamily="18" charset="0"/>
-                <a:cs typeface="Times New Roman" panose="02020603050405020304" pitchFamily="18" charset="0"/>
-              </a:rPr>
-              <a:t>. </a:t>
-            </a:r>
-          </a:p>
-          <a:p>
-            <a:pPr marL="0" indent="0" algn="just">
-              <a:buNone/>
-            </a:pPr>
-            <a:r>
-              <a:rPr lang="pt-BR" sz="2000" b="1" dirty="0">
-                <a:solidFill>
-                  <a:srgbClr val="FF0000"/>
-                </a:solidFill>
-                <a:latin typeface="Times New Roman" panose="02020603050405020304" pitchFamily="18" charset="0"/>
-                <a:cs typeface="Times New Roman" panose="02020603050405020304" pitchFamily="18" charset="0"/>
-              </a:rPr>
-              <a:t>Disponível em: </a:t>
-            </a:r>
-            <a:r>
-              <a:rPr lang="pt-BR" sz="2000" dirty="0">
-                <a:latin typeface="Times New Roman" panose="02020603050405020304" pitchFamily="18" charset="0"/>
-                <a:cs typeface="Times New Roman" panose="02020603050405020304" pitchFamily="18" charset="0"/>
-                <a:hlinkClick r:id="rId4"/>
-              </a:rPr>
-              <a:t>https://youtu.be/r-uOLxNrNk8</a:t>
-            </a:r>
-            <a:r>
-              <a:rPr lang="pt-BR" sz="2000" dirty="0">
-                <a:latin typeface="Times New Roman" panose="02020603050405020304" pitchFamily="18" charset="0"/>
-                <a:cs typeface="Times New Roman" panose="02020603050405020304" pitchFamily="18" charset="0"/>
-              </a:rPr>
-              <a:t> </a:t>
-            </a:r>
-          </a:p>
-          <a:p>
-            <a:pPr marL="0" indent="0" algn="just">
-              <a:buNone/>
-            </a:pPr>
             <a:endParaRPr lang="pt-BR" sz="2000" dirty="0">
               <a:latin typeface="Times New Roman" panose="02020603050405020304" pitchFamily="18" charset="0"/>
               <a:cs typeface="Times New Roman" panose="02020603050405020304" pitchFamily="18" charset="0"/>
+            </a:endParaRPr>
+          </a:p>
+          <a:p>
+            <a:pPr marL="0" indent="0" algn="just">
+              <a:buNone/>
+            </a:pPr>
+            <a:endParaRPr lang="pt-BR" sz="2000" dirty="0">
+              <a:latin typeface="Times New Roman" panose="02020603050405020304" pitchFamily="18" charset="0"/>
+              <a:cs typeface="Times New Roman" panose="02020603050405020304" pitchFamily="18" charset="0"/>
+            </a:endParaRPr>
+          </a:p>
+          <a:p>
+            <a:pPr marL="0" indent="0" algn="just">
+              <a:buNone/>
+            </a:pPr>
+            <a:endParaRPr lang="pt-BR" sz="2000" dirty="0">
+              <a:latin typeface="Calibri" panose="020F0502020204030204" pitchFamily="34" charset="0"/>
             </a:endParaRPr>
           </a:p>
         </p:txBody>
@@ -7650,7 +7890,7 @@
     </p:spTree>
     <p:extLst>
       <p:ext uri="{BB962C8B-B14F-4D97-AF65-F5344CB8AC3E}">
-        <p14:creationId xmlns:p14="http://schemas.microsoft.com/office/powerpoint/2010/main" val="2747596967"/>
+        <p14:creationId xmlns:p14="http://schemas.microsoft.com/office/powerpoint/2010/main" val="3680270425"/>
       </p:ext>
     </p:extLst>
   </p:cSld>
@@ -7706,7 +7946,7 @@
                   <a:srgbClr val="0070C0"/>
                 </a:solidFill>
               </a:rPr>
-              <a:t>Dinâmica</a:t>
+              <a:t>Aprenda</a:t>
             </a:r>
             <a:r>
               <a:rPr lang="en-US" b="1" dirty="0">
@@ -7714,21 +7954,8 @@
                   <a:srgbClr val="0070C0"/>
                 </a:solidFill>
               </a:rPr>
-              <a:t>/</a:t>
-            </a:r>
-            <a:r>
-              <a:rPr lang="en-US" b="1" dirty="0" err="1">
-                <a:solidFill>
-                  <a:srgbClr val="0070C0"/>
-                </a:solidFill>
-              </a:rPr>
-              <a:t>Atividades</a:t>
-            </a:r>
-            <a:endParaRPr lang="en-US" b="1" dirty="0">
-              <a:solidFill>
-                <a:srgbClr val="0070C0"/>
-              </a:solidFill>
-            </a:endParaRPr>
+              <a:t>+</a:t>
+            </a:r>
           </a:p>
         </p:txBody>
       </p:sp>
@@ -7744,8 +7971,8 @@
         </p:nvSpPr>
         <p:spPr>
           <a:xfrm>
-            <a:off x="139472" y="1063230"/>
-            <a:ext cx="8865056" cy="3606305"/>
+            <a:off x="142865" y="1200150"/>
+            <a:ext cx="8865056" cy="3737370"/>
           </a:xfrm>
         </p:spPr>
         <p:txBody>
@@ -7762,7 +7989,51 @@
                 <a:latin typeface="Times New Roman" panose="02020603050405020304" pitchFamily="18" charset="0"/>
                 <a:cs typeface="Times New Roman" panose="02020603050405020304" pitchFamily="18" charset="0"/>
               </a:rPr>
-              <a:t>Exercícios </a:t>
+              <a:t>[1] </a:t>
+            </a:r>
+            <a:r>
+              <a:rPr lang="en-US" sz="2000" b="1" dirty="0">
+                <a:latin typeface="Times New Roman" panose="02020603050405020304" pitchFamily="18" charset="0"/>
+                <a:cs typeface="Times New Roman" panose="02020603050405020304" pitchFamily="18" charset="0"/>
+              </a:rPr>
+              <a:t>Big Data Analytics Using Python | Python Big Data</a:t>
+            </a:r>
+            <a:r>
+              <a:rPr lang="pt-BR" sz="2000" dirty="0">
+                <a:latin typeface="Times New Roman" panose="02020603050405020304" pitchFamily="18" charset="0"/>
+                <a:cs typeface="Times New Roman" panose="02020603050405020304" pitchFamily="18" charset="0"/>
+              </a:rPr>
+              <a:t>.</a:t>
+            </a:r>
+          </a:p>
+          <a:p>
+            <a:pPr marL="0" indent="0" algn="just">
+              <a:buNone/>
+            </a:pPr>
+            <a:r>
+              <a:rPr lang="pt-BR" sz="2000" b="1" dirty="0">
+                <a:solidFill>
+                  <a:srgbClr val="FF0000"/>
+                </a:solidFill>
+                <a:latin typeface="Times New Roman" panose="02020603050405020304" pitchFamily="18" charset="0"/>
+                <a:cs typeface="Times New Roman" panose="02020603050405020304" pitchFamily="18" charset="0"/>
+              </a:rPr>
+              <a:t>Disponível em: </a:t>
+            </a:r>
+            <a:r>
+              <a:rPr lang="pt-BR" sz="2000" dirty="0">
+                <a:latin typeface="Times New Roman" panose="02020603050405020304" pitchFamily="18" charset="0"/>
+                <a:cs typeface="Times New Roman" panose="02020603050405020304" pitchFamily="18" charset="0"/>
+                <a:hlinkClick r:id="rId3"/>
+              </a:rPr>
+              <a:t>https://youtu.be/cUw3DsDpQCE</a:t>
+            </a:r>
+            <a:r>
+              <a:rPr lang="pt-BR" sz="2000" dirty="0">
+                <a:latin typeface="Times New Roman" panose="02020603050405020304" pitchFamily="18" charset="0"/>
+                <a:cs typeface="Times New Roman" panose="02020603050405020304" pitchFamily="18" charset="0"/>
+              </a:rPr>
+              <a:t> </a:t>
             </a:r>
           </a:p>
           <a:p>
@@ -7778,10 +8049,89 @@
             <a:pPr marL="0" indent="0" algn="just">
               <a:buNone/>
             </a:pPr>
-            <a:endParaRPr lang="pt-BR" sz="2000">
+            <a:endParaRPr lang="pt-BR" sz="2000" dirty="0">
               <a:latin typeface="Times New Roman" panose="02020603050405020304" pitchFamily="18" charset="0"/>
               <a:cs typeface="Times New Roman" panose="02020603050405020304" pitchFamily="18" charset="0"/>
             </a:endParaRPr>
+          </a:p>
+          <a:p>
+            <a:pPr marL="0" indent="0" algn="just">
+              <a:buNone/>
+            </a:pPr>
+            <a:endParaRPr lang="pt-BR" sz="2000" dirty="0">
+              <a:latin typeface="Times New Roman" panose="02020603050405020304" pitchFamily="18" charset="0"/>
+              <a:cs typeface="Times New Roman" panose="02020603050405020304" pitchFamily="18" charset="0"/>
+            </a:endParaRPr>
+          </a:p>
+          <a:p>
+            <a:pPr marL="0" indent="0" algn="just">
+              <a:buNone/>
+            </a:pPr>
+            <a:r>
+              <a:rPr lang="pt-BR" sz="2000" dirty="0">
+                <a:latin typeface="Times New Roman" panose="02020603050405020304" pitchFamily="18" charset="0"/>
+                <a:cs typeface="Times New Roman" panose="02020603050405020304" pitchFamily="18" charset="0"/>
+              </a:rPr>
+              <a:t>[2] </a:t>
+            </a:r>
+            <a:r>
+              <a:rPr lang="en-US" sz="2000" b="1" dirty="0">
+                <a:latin typeface="Times New Roman" panose="02020603050405020304" pitchFamily="18" charset="0"/>
+                <a:cs typeface="Times New Roman" panose="02020603050405020304" pitchFamily="18" charset="0"/>
+              </a:rPr>
+              <a:t>Data Analysis with Python - Course (</a:t>
+            </a:r>
+            <a:r>
+              <a:rPr lang="en-US" sz="2000" b="1" dirty="0" err="1">
+                <a:latin typeface="Times New Roman" panose="02020603050405020304" pitchFamily="18" charset="0"/>
+                <a:cs typeface="Times New Roman" panose="02020603050405020304" pitchFamily="18" charset="0"/>
+              </a:rPr>
+              <a:t>Numpy</a:t>
+            </a:r>
+            <a:r>
+              <a:rPr lang="en-US" sz="2000" b="1" dirty="0">
+                <a:latin typeface="Times New Roman" panose="02020603050405020304" pitchFamily="18" charset="0"/>
+                <a:cs typeface="Times New Roman" panose="02020603050405020304" pitchFamily="18" charset="0"/>
+              </a:rPr>
+              <a:t>, Pandas, Matplotlib, Seaborn)</a:t>
+            </a:r>
+            <a:r>
+              <a:rPr lang="pt-BR" sz="2000" dirty="0">
+                <a:latin typeface="Times New Roman" panose="02020603050405020304" pitchFamily="18" charset="0"/>
+                <a:cs typeface="Times New Roman" panose="02020603050405020304" pitchFamily="18" charset="0"/>
+              </a:rPr>
+              <a:t>. </a:t>
+            </a:r>
+          </a:p>
+          <a:p>
+            <a:pPr marL="0" indent="0" algn="just">
+              <a:buNone/>
+            </a:pPr>
+            <a:r>
+              <a:rPr lang="pt-BR" sz="2000" b="1" dirty="0">
+                <a:solidFill>
+                  <a:srgbClr val="FF0000"/>
+                </a:solidFill>
+                <a:latin typeface="Times New Roman" panose="02020603050405020304" pitchFamily="18" charset="0"/>
+                <a:cs typeface="Times New Roman" panose="02020603050405020304" pitchFamily="18" charset="0"/>
+              </a:rPr>
+              <a:t>Disponível em: </a:t>
+            </a:r>
+            <a:r>
+              <a:rPr lang="pt-BR" sz="2000" dirty="0">
+                <a:latin typeface="Times New Roman" panose="02020603050405020304" pitchFamily="18" charset="0"/>
+                <a:cs typeface="Times New Roman" panose="02020603050405020304" pitchFamily="18" charset="0"/>
+                <a:hlinkClick r:id="rId4"/>
+              </a:rPr>
+              <a:t>https://youtu.be/r-uOLxNrNk8</a:t>
+            </a:r>
+            <a:r>
+              <a:rPr lang="pt-BR" sz="2000" dirty="0">
+                <a:latin typeface="Times New Roman" panose="02020603050405020304" pitchFamily="18" charset="0"/>
+                <a:cs typeface="Times New Roman" panose="02020603050405020304" pitchFamily="18" charset="0"/>
+              </a:rPr>
+              <a:t> </a:t>
+            </a:r>
           </a:p>
           <a:p>
             <a:pPr marL="0" indent="0" algn="just">
@@ -7797,7 +8147,7 @@
     </p:spTree>
     <p:extLst>
       <p:ext uri="{BB962C8B-B14F-4D97-AF65-F5344CB8AC3E}">
-        <p14:creationId xmlns:p14="http://schemas.microsoft.com/office/powerpoint/2010/main" val="1397642976"/>
+        <p14:creationId xmlns:p14="http://schemas.microsoft.com/office/powerpoint/2010/main" val="2747596967"/>
       </p:ext>
     </p:extLst>
   </p:cSld>
@@ -8339,6 +8689,1067 @@
                   <a:srgbClr val="0070C0"/>
                 </a:solidFill>
               </a:rPr>
+              <a:t>Dinâmica</a:t>
+            </a:r>
+            <a:r>
+              <a:rPr lang="en-US" b="1" dirty="0">
+                <a:solidFill>
+                  <a:srgbClr val="0070C0"/>
+                </a:solidFill>
+              </a:rPr>
+              <a:t>/</a:t>
+            </a:r>
+            <a:r>
+              <a:rPr lang="en-US" b="1" dirty="0" err="1">
+                <a:solidFill>
+                  <a:srgbClr val="0070C0"/>
+                </a:solidFill>
+              </a:rPr>
+              <a:t>Atividades</a:t>
+            </a:r>
+            <a:endParaRPr lang="en-US" b="1" dirty="0">
+              <a:solidFill>
+                <a:srgbClr val="0070C0"/>
+              </a:solidFill>
+            </a:endParaRPr>
+          </a:p>
+        </p:txBody>
+      </p:sp>
+      <p:sp>
+        <p:nvSpPr>
+          <p:cNvPr id="8" name="Text Placeholder 2"/>
+          <p:cNvSpPr>
+            <a:spLocks noGrp="1"/>
+          </p:cNvSpPr>
+          <p:nvPr>
+            <p:ph type="body" sz="half" idx="1"/>
+          </p:nvPr>
+        </p:nvSpPr>
+        <p:spPr>
+          <a:xfrm>
+            <a:off x="139472" y="1063230"/>
+            <a:ext cx="8865056" cy="3874290"/>
+          </a:xfrm>
+        </p:spPr>
+        <p:txBody>
+          <a:bodyPr>
+            <a:noAutofit/>
+          </a:bodyPr>
+          <a:lstStyle/>
+          <a:p>
+            <a:pPr marL="0" indent="0" algn="just">
+              <a:buNone/>
+            </a:pPr>
+            <a:r>
+              <a:rPr lang="pt-BR" sz="2000" b="1" dirty="0" err="1">
+                <a:solidFill>
+                  <a:srgbClr val="FF0000"/>
+                </a:solidFill>
+                <a:latin typeface="Times New Roman" panose="02020603050405020304" pitchFamily="18" charset="0"/>
+                <a:cs typeface="Times New Roman" panose="02020603050405020304" pitchFamily="18" charset="0"/>
+              </a:rPr>
+              <a:t>Datasets</a:t>
+            </a:r>
+            <a:r>
+              <a:rPr lang="pt-BR" sz="2000" b="1" dirty="0">
+                <a:solidFill>
+                  <a:srgbClr val="FF0000"/>
+                </a:solidFill>
+                <a:latin typeface="Times New Roman" panose="02020603050405020304" pitchFamily="18" charset="0"/>
+                <a:cs typeface="Times New Roman" panose="02020603050405020304" pitchFamily="18" charset="0"/>
+              </a:rPr>
+              <a:t> Abertos (URL)</a:t>
+            </a:r>
+          </a:p>
+          <a:p>
+            <a:pPr marL="0" indent="0" algn="just">
+              <a:buNone/>
+            </a:pPr>
+            <a:endParaRPr lang="pt-BR" sz="2000" dirty="0">
+              <a:latin typeface="Times New Roman" panose="02020603050405020304" pitchFamily="18" charset="0"/>
+              <a:cs typeface="Times New Roman" panose="02020603050405020304" pitchFamily="18" charset="0"/>
+            </a:endParaRPr>
+          </a:p>
+          <a:p>
+            <a:pPr algn="just">
+              <a:buFont typeface="Wingdings" panose="05000000000000000000" pitchFamily="2" charset="2"/>
+              <a:buChar char="§"/>
+            </a:pPr>
+            <a:r>
+              <a:rPr lang="pt-BR" sz="2000" dirty="0">
+                <a:latin typeface="Times New Roman" panose="02020603050405020304" pitchFamily="18" charset="0"/>
+                <a:cs typeface="Times New Roman" panose="02020603050405020304" pitchFamily="18" charset="0"/>
+              </a:rPr>
+              <a:t>https://dados.gov.br</a:t>
+            </a:r>
+          </a:p>
+          <a:p>
+            <a:pPr algn="just">
+              <a:buFont typeface="Wingdings" panose="05000000000000000000" pitchFamily="2" charset="2"/>
+              <a:buChar char="§"/>
+            </a:pPr>
+            <a:r>
+              <a:rPr lang="pt-BR" sz="2000" dirty="0">
+                <a:latin typeface="Times New Roman" panose="02020603050405020304" pitchFamily="18" charset="0"/>
+                <a:cs typeface="Times New Roman" panose="02020603050405020304" pitchFamily="18" charset="0"/>
+              </a:rPr>
+              <a:t>https://brasil.io/home/</a:t>
+            </a:r>
+          </a:p>
+          <a:p>
+            <a:pPr algn="just">
+              <a:buFont typeface="Wingdings" panose="05000000000000000000" pitchFamily="2" charset="2"/>
+              <a:buChar char="§"/>
+            </a:pPr>
+            <a:r>
+              <a:rPr lang="pt-BR" sz="2000" dirty="0">
+                <a:latin typeface="Times New Roman" panose="02020603050405020304" pitchFamily="18" charset="0"/>
+                <a:cs typeface="Times New Roman" panose="02020603050405020304" pitchFamily="18" charset="0"/>
+              </a:rPr>
+              <a:t>https://www2.camara.leg.br/transparencia/dados-abertos/dados-abertos-legislativo/</a:t>
+            </a:r>
+          </a:p>
+          <a:p>
+            <a:pPr algn="just">
+              <a:buFont typeface="Wingdings" panose="05000000000000000000" pitchFamily="2" charset="2"/>
+              <a:buChar char="§"/>
+            </a:pPr>
+            <a:r>
+              <a:rPr lang="pt-BR" sz="2000" dirty="0">
+                <a:latin typeface="Times New Roman" panose="02020603050405020304" pitchFamily="18" charset="0"/>
+                <a:cs typeface="Times New Roman" panose="02020603050405020304" pitchFamily="18" charset="0"/>
+              </a:rPr>
+              <a:t>https://dadosabertos.camara.leg.br/</a:t>
+            </a:r>
+          </a:p>
+          <a:p>
+            <a:pPr algn="just">
+              <a:buFont typeface="Wingdings" panose="05000000000000000000" pitchFamily="2" charset="2"/>
+              <a:buChar char="§"/>
+            </a:pPr>
+            <a:r>
+              <a:rPr lang="pt-BR" sz="2000" dirty="0">
+                <a:latin typeface="Times New Roman" panose="02020603050405020304" pitchFamily="18" charset="0"/>
+                <a:cs typeface="Times New Roman" panose="02020603050405020304" pitchFamily="18" charset="0"/>
+              </a:rPr>
+              <a:t>https://senano.leg.br/</a:t>
+            </a:r>
+          </a:p>
+          <a:p>
+            <a:pPr algn="just">
+              <a:buFont typeface="Wingdings" panose="05000000000000000000" pitchFamily="2" charset="2"/>
+              <a:buChar char="§"/>
+            </a:pPr>
+            <a:r>
+              <a:rPr lang="pt-BR" sz="2000" dirty="0">
+                <a:latin typeface="Times New Roman" panose="02020603050405020304" pitchFamily="18" charset="0"/>
+                <a:cs typeface="Times New Roman" panose="02020603050405020304" pitchFamily="18" charset="0"/>
+              </a:rPr>
+              <a:t>https://dados.df.gov.br/</a:t>
+            </a:r>
+          </a:p>
+          <a:p>
+            <a:pPr algn="just">
+              <a:buFont typeface="Wingdings" panose="05000000000000000000" pitchFamily="2" charset="2"/>
+              <a:buChar char="§"/>
+            </a:pPr>
+            <a:r>
+              <a:rPr lang="pt-BR" sz="2000" dirty="0">
+                <a:latin typeface="Times New Roman" panose="02020603050405020304" pitchFamily="18" charset="0"/>
+                <a:cs typeface="Times New Roman" panose="02020603050405020304" pitchFamily="18" charset="0"/>
+              </a:rPr>
+              <a:t>https://patiodigital.prefeitura.sp.gov.br/</a:t>
+            </a:r>
+          </a:p>
+        </p:txBody>
+      </p:sp>
+    </p:spTree>
+    <p:extLst>
+      <p:ext uri="{BB962C8B-B14F-4D97-AF65-F5344CB8AC3E}">
+        <p14:creationId xmlns:p14="http://schemas.microsoft.com/office/powerpoint/2010/main" val="1397642976"/>
+      </p:ext>
+    </p:extLst>
+  </p:cSld>
+  <p:clrMapOvr>
+    <a:masterClrMapping/>
+  </p:clrMapOvr>
+  <p:transition spd="med"/>
+</p:sld>
+</file>
+
+<file path=ppt/slides/slide21.xml><?xml version="1.0" encoding="utf-8"?>
+<p:sld xmlns:a="http://schemas.openxmlformats.org/drawingml/2006/main" xmlns:r="http://schemas.openxmlformats.org/officeDocument/2006/relationships" xmlns:p="http://schemas.openxmlformats.org/presentationml/2006/main">
+  <p:cSld>
+    <p:spTree>
+      <p:nvGrpSpPr>
+        <p:cNvPr id="1" name=""/>
+        <p:cNvGrpSpPr/>
+        <p:nvPr/>
+      </p:nvGrpSpPr>
+      <p:grpSpPr>
+        <a:xfrm>
+          <a:off x="0" y="0"/>
+          <a:ext cx="0" cy="0"/>
+          <a:chOff x="0" y="0"/>
+          <a:chExt cx="0" cy="0"/>
+        </a:xfrm>
+      </p:grpSpPr>
+      <p:sp>
+        <p:nvSpPr>
+          <p:cNvPr id="6" name="Title 1"/>
+          <p:cNvSpPr>
+            <a:spLocks noGrp="1"/>
+          </p:cNvSpPr>
+          <p:nvPr>
+            <p:ph type="title"/>
+          </p:nvPr>
+        </p:nvSpPr>
+        <p:spPr>
+          <a:xfrm>
+            <a:off x="457200" y="205980"/>
+            <a:ext cx="8229600" cy="857251"/>
+          </a:xfrm>
+        </p:spPr>
+        <p:txBody>
+          <a:bodyPr>
+            <a:normAutofit/>
+          </a:bodyPr>
+          <a:lstStyle/>
+          <a:p>
+            <a:r>
+              <a:rPr lang="en-US" b="1" dirty="0" err="1">
+                <a:solidFill>
+                  <a:srgbClr val="0070C0"/>
+                </a:solidFill>
+              </a:rPr>
+              <a:t>Dinâmica</a:t>
+            </a:r>
+            <a:r>
+              <a:rPr lang="en-US" b="1" dirty="0">
+                <a:solidFill>
+                  <a:srgbClr val="0070C0"/>
+                </a:solidFill>
+              </a:rPr>
+              <a:t>/</a:t>
+            </a:r>
+            <a:r>
+              <a:rPr lang="en-US" b="1" dirty="0" err="1">
+                <a:solidFill>
+                  <a:srgbClr val="0070C0"/>
+                </a:solidFill>
+              </a:rPr>
+              <a:t>Atividades</a:t>
+            </a:r>
+            <a:endParaRPr lang="en-US" b="1" dirty="0">
+              <a:solidFill>
+                <a:srgbClr val="0070C0"/>
+              </a:solidFill>
+            </a:endParaRPr>
+          </a:p>
+        </p:txBody>
+      </p:sp>
+      <p:sp>
+        <p:nvSpPr>
+          <p:cNvPr id="8" name="Text Placeholder 2"/>
+          <p:cNvSpPr>
+            <a:spLocks noGrp="1"/>
+          </p:cNvSpPr>
+          <p:nvPr>
+            <p:ph type="body" sz="half" idx="1"/>
+          </p:nvPr>
+        </p:nvSpPr>
+        <p:spPr>
+          <a:xfrm>
+            <a:off x="139472" y="1063230"/>
+            <a:ext cx="8865056" cy="3874290"/>
+          </a:xfrm>
+        </p:spPr>
+        <p:txBody>
+          <a:bodyPr>
+            <a:noAutofit/>
+          </a:bodyPr>
+          <a:lstStyle/>
+          <a:p>
+            <a:pPr marL="0" indent="0" algn="just">
+              <a:buNone/>
+            </a:pPr>
+            <a:r>
+              <a:rPr lang="pt-BR" sz="1800" dirty="0">
+                <a:latin typeface="Times New Roman" panose="02020603050405020304" pitchFamily="18" charset="0"/>
+                <a:cs typeface="Times New Roman" panose="02020603050405020304" pitchFamily="18" charset="0"/>
+              </a:rPr>
+              <a:t># biblioteca </a:t>
+            </a:r>
+            <a:r>
+              <a:rPr lang="pt-BR" sz="1800" b="1" dirty="0">
+                <a:latin typeface="Times New Roman" panose="02020603050405020304" pitchFamily="18" charset="0"/>
+                <a:cs typeface="Times New Roman" panose="02020603050405020304" pitchFamily="18" charset="0"/>
+              </a:rPr>
+              <a:t>anaconda</a:t>
+            </a:r>
+            <a:r>
+              <a:rPr lang="pt-BR" sz="1800" dirty="0">
+                <a:latin typeface="Times New Roman" panose="02020603050405020304" pitchFamily="18" charset="0"/>
+                <a:cs typeface="Times New Roman" panose="02020603050405020304" pitchFamily="18" charset="0"/>
+              </a:rPr>
+              <a:t>(</a:t>
+            </a:r>
+            <a:r>
+              <a:rPr lang="pt-BR" sz="1800" b="1" dirty="0">
+                <a:solidFill>
+                  <a:srgbClr val="FF0000"/>
+                </a:solidFill>
+                <a:latin typeface="Times New Roman" panose="02020603050405020304" pitchFamily="18" charset="0"/>
+                <a:cs typeface="Times New Roman" panose="02020603050405020304" pitchFamily="18" charset="0"/>
+              </a:rPr>
+              <a:t>pandas, </a:t>
+            </a:r>
+            <a:r>
+              <a:rPr lang="pt-BR" sz="1800" b="1" dirty="0" err="1">
+                <a:solidFill>
+                  <a:srgbClr val="FF0000"/>
+                </a:solidFill>
+                <a:latin typeface="Times New Roman" panose="02020603050405020304" pitchFamily="18" charset="0"/>
+                <a:cs typeface="Times New Roman" panose="02020603050405020304" pitchFamily="18" charset="0"/>
+              </a:rPr>
+              <a:t>etc</a:t>
+            </a:r>
+            <a:r>
+              <a:rPr lang="pt-BR" sz="1800" dirty="0">
+                <a:latin typeface="Times New Roman" panose="02020603050405020304" pitchFamily="18" charset="0"/>
+                <a:cs typeface="Times New Roman" panose="02020603050405020304" pitchFamily="18" charset="0"/>
+              </a:rPr>
+              <a:t>); </a:t>
+            </a:r>
+            <a:r>
+              <a:rPr lang="pt-BR" sz="1800" b="1" dirty="0">
+                <a:latin typeface="Times New Roman" panose="02020603050405020304" pitchFamily="18" charset="0"/>
+                <a:cs typeface="Times New Roman" panose="02020603050405020304" pitchFamily="18" charset="0"/>
+              </a:rPr>
+              <a:t>Google </a:t>
+            </a:r>
+            <a:r>
+              <a:rPr lang="pt-BR" sz="1800" b="1" dirty="0" err="1">
+                <a:latin typeface="Times New Roman" panose="02020603050405020304" pitchFamily="18" charset="0"/>
+                <a:cs typeface="Times New Roman" panose="02020603050405020304" pitchFamily="18" charset="0"/>
+              </a:rPr>
+              <a:t>Colab</a:t>
+            </a:r>
+            <a:endParaRPr lang="pt-BR" sz="1800" b="1" dirty="0">
+              <a:latin typeface="Times New Roman" panose="02020603050405020304" pitchFamily="18" charset="0"/>
+              <a:cs typeface="Times New Roman" panose="02020603050405020304" pitchFamily="18" charset="0"/>
+            </a:endParaRPr>
+          </a:p>
+          <a:p>
+            <a:pPr marL="0" indent="0" algn="just">
+              <a:buNone/>
+            </a:pPr>
+            <a:endParaRPr lang="pt-BR" sz="1800" b="1" dirty="0">
+              <a:latin typeface="Times New Roman" panose="02020603050405020304" pitchFamily="18" charset="0"/>
+              <a:cs typeface="Times New Roman" panose="02020603050405020304" pitchFamily="18" charset="0"/>
+            </a:endParaRPr>
+          </a:p>
+          <a:p>
+            <a:pPr marL="0" indent="0" algn="just">
+              <a:buNone/>
+            </a:pPr>
+            <a:r>
+              <a:rPr lang="pt-BR" sz="1800" b="1" dirty="0" err="1">
+                <a:latin typeface="Times New Roman" panose="02020603050405020304" pitchFamily="18" charset="0"/>
+                <a:cs typeface="Times New Roman" panose="02020603050405020304" pitchFamily="18" charset="0"/>
+              </a:rPr>
+              <a:t>import</a:t>
+            </a:r>
+            <a:r>
+              <a:rPr lang="pt-BR" sz="1800" dirty="0">
+                <a:latin typeface="Times New Roman" panose="02020603050405020304" pitchFamily="18" charset="0"/>
+                <a:cs typeface="Times New Roman" panose="02020603050405020304" pitchFamily="18" charset="0"/>
+              </a:rPr>
+              <a:t> </a:t>
+            </a:r>
+            <a:r>
+              <a:rPr lang="pt-BR" sz="1800" b="1" dirty="0">
+                <a:solidFill>
+                  <a:srgbClr val="FF0000"/>
+                </a:solidFill>
+                <a:latin typeface="Times New Roman" panose="02020603050405020304" pitchFamily="18" charset="0"/>
+                <a:cs typeface="Times New Roman" panose="02020603050405020304" pitchFamily="18" charset="0"/>
+              </a:rPr>
+              <a:t>pandas</a:t>
+            </a:r>
+            <a:r>
+              <a:rPr lang="pt-BR" sz="1800" dirty="0">
+                <a:latin typeface="Times New Roman" panose="02020603050405020304" pitchFamily="18" charset="0"/>
+                <a:cs typeface="Times New Roman" panose="02020603050405020304" pitchFamily="18" charset="0"/>
+              </a:rPr>
+              <a:t> as </a:t>
+            </a:r>
+            <a:r>
+              <a:rPr lang="pt-BR" sz="1800" dirty="0" err="1">
+                <a:latin typeface="Times New Roman" panose="02020603050405020304" pitchFamily="18" charset="0"/>
+                <a:cs typeface="Times New Roman" panose="02020603050405020304" pitchFamily="18" charset="0"/>
+              </a:rPr>
+              <a:t>pd</a:t>
+            </a:r>
+            <a:r>
+              <a:rPr lang="pt-BR" sz="1800" dirty="0">
+                <a:latin typeface="Times New Roman" panose="02020603050405020304" pitchFamily="18" charset="0"/>
+                <a:cs typeface="Times New Roman" panose="02020603050405020304" pitchFamily="18" charset="0"/>
+              </a:rPr>
+              <a:t> # converter para </a:t>
+            </a:r>
+            <a:r>
+              <a:rPr lang="pt-BR" sz="1800" dirty="0" err="1">
+                <a:latin typeface="Times New Roman" panose="02020603050405020304" pitchFamily="18" charset="0"/>
+                <a:cs typeface="Times New Roman" panose="02020603050405020304" pitchFamily="18" charset="0"/>
+              </a:rPr>
+              <a:t>DataFrame</a:t>
+            </a:r>
+            <a:r>
+              <a:rPr lang="pt-BR" sz="1800" dirty="0">
+                <a:latin typeface="Times New Roman" panose="02020603050405020304" pitchFamily="18" charset="0"/>
+                <a:cs typeface="Times New Roman" panose="02020603050405020304" pitchFamily="18" charset="0"/>
+              </a:rPr>
+              <a:t>(</a:t>
+            </a:r>
+            <a:r>
+              <a:rPr lang="pt-BR" sz="1800" dirty="0" err="1">
+                <a:latin typeface="Times New Roman" panose="02020603050405020304" pitchFamily="18" charset="0"/>
+                <a:cs typeface="Times New Roman" panose="02020603050405020304" pitchFamily="18" charset="0"/>
+              </a:rPr>
+              <a:t>df</a:t>
+            </a:r>
+            <a:r>
+              <a:rPr lang="pt-BR" sz="1800" dirty="0">
+                <a:latin typeface="Times New Roman" panose="02020603050405020304" pitchFamily="18" charset="0"/>
+                <a:cs typeface="Times New Roman" panose="02020603050405020304" pitchFamily="18" charset="0"/>
+              </a:rPr>
+              <a:t>)</a:t>
+            </a:r>
+          </a:p>
+          <a:p>
+            <a:pPr marL="0" indent="0" algn="just">
+              <a:buNone/>
+            </a:pPr>
+            <a:r>
+              <a:rPr lang="pt-BR" sz="1800" dirty="0">
+                <a:latin typeface="Times New Roman" panose="02020603050405020304" pitchFamily="18" charset="0"/>
+                <a:cs typeface="Times New Roman" panose="02020603050405020304" pitchFamily="18" charset="0"/>
+              </a:rPr>
+              <a:t># padrão eh “,”, mas pode ser diferente, talvez necessário informar o encode</a:t>
+            </a:r>
+          </a:p>
+          <a:p>
+            <a:pPr marL="0" indent="0" algn="just">
+              <a:buNone/>
+            </a:pPr>
+            <a:r>
+              <a:rPr lang="pt-BR" sz="1800" dirty="0" err="1">
+                <a:latin typeface="Times New Roman" panose="02020603050405020304" pitchFamily="18" charset="0"/>
+                <a:cs typeface="Times New Roman" panose="02020603050405020304" pitchFamily="18" charset="0"/>
+              </a:rPr>
+              <a:t>df</a:t>
+            </a:r>
+            <a:r>
+              <a:rPr lang="pt-BR" sz="1800" dirty="0">
+                <a:latin typeface="Times New Roman" panose="02020603050405020304" pitchFamily="18" charset="0"/>
+                <a:cs typeface="Times New Roman" panose="02020603050405020304" pitchFamily="18" charset="0"/>
+              </a:rPr>
+              <a:t> = </a:t>
+            </a:r>
+            <a:r>
+              <a:rPr lang="pt-BR" sz="1800" dirty="0" err="1">
+                <a:latin typeface="Times New Roman" panose="02020603050405020304" pitchFamily="18" charset="0"/>
+                <a:cs typeface="Times New Roman" panose="02020603050405020304" pitchFamily="18" charset="0"/>
+              </a:rPr>
+              <a:t>pd.</a:t>
+            </a:r>
+            <a:r>
+              <a:rPr lang="pt-BR" sz="1800" b="1" dirty="0" err="1">
+                <a:latin typeface="Times New Roman" panose="02020603050405020304" pitchFamily="18" charset="0"/>
+                <a:cs typeface="Times New Roman" panose="02020603050405020304" pitchFamily="18" charset="0"/>
+              </a:rPr>
+              <a:t>read_csv</a:t>
+            </a:r>
+            <a:r>
+              <a:rPr lang="pt-BR" sz="1800" dirty="0">
+                <a:latin typeface="Times New Roman" panose="02020603050405020304" pitchFamily="18" charset="0"/>
+                <a:cs typeface="Times New Roman" panose="02020603050405020304" pitchFamily="18" charset="0"/>
+              </a:rPr>
+              <a:t>(‘</a:t>
+            </a:r>
+            <a:r>
+              <a:rPr lang="pt-BR" sz="1800" dirty="0" err="1">
+                <a:latin typeface="Times New Roman" panose="02020603050405020304" pitchFamily="18" charset="0"/>
+                <a:cs typeface="Times New Roman" panose="02020603050405020304" pitchFamily="18" charset="0"/>
+              </a:rPr>
+              <a:t>sample_data</a:t>
+            </a:r>
+            <a:r>
+              <a:rPr lang="pt-BR" sz="1800" dirty="0">
+                <a:latin typeface="Times New Roman" panose="02020603050405020304" pitchFamily="18" charset="0"/>
+                <a:cs typeface="Times New Roman" panose="02020603050405020304" pitchFamily="18" charset="0"/>
+              </a:rPr>
+              <a:t>/arq.csv’, </a:t>
+            </a:r>
+            <a:r>
+              <a:rPr lang="pt-BR" sz="1800" dirty="0" err="1">
+                <a:latin typeface="Times New Roman" panose="02020603050405020304" pitchFamily="18" charset="0"/>
+                <a:cs typeface="Times New Roman" panose="02020603050405020304" pitchFamily="18" charset="0"/>
+              </a:rPr>
+              <a:t>sep</a:t>
+            </a:r>
+            <a:r>
+              <a:rPr lang="pt-BR" sz="1800" dirty="0">
+                <a:latin typeface="Times New Roman" panose="02020603050405020304" pitchFamily="18" charset="0"/>
+                <a:cs typeface="Times New Roman" panose="02020603050405020304" pitchFamily="18" charset="0"/>
+              </a:rPr>
+              <a:t>=‘;’, </a:t>
+            </a:r>
+            <a:r>
+              <a:rPr lang="pt-BR" sz="1800" dirty="0" err="1">
+                <a:latin typeface="Times New Roman" panose="02020603050405020304" pitchFamily="18" charset="0"/>
+                <a:cs typeface="Times New Roman" panose="02020603050405020304" pitchFamily="18" charset="0"/>
+              </a:rPr>
+              <a:t>encoding</a:t>
+            </a:r>
+            <a:r>
+              <a:rPr lang="pt-BR" sz="1800" dirty="0">
+                <a:latin typeface="Times New Roman" panose="02020603050405020304" pitchFamily="18" charset="0"/>
+                <a:cs typeface="Times New Roman" panose="02020603050405020304" pitchFamily="18" charset="0"/>
+              </a:rPr>
+              <a:t>=‘cp1252’)</a:t>
+            </a:r>
+          </a:p>
+          <a:p>
+            <a:pPr marL="0" indent="0" algn="just">
+              <a:buNone/>
+            </a:pPr>
+            <a:r>
+              <a:rPr lang="pt-BR" sz="1800" dirty="0" err="1">
+                <a:latin typeface="Times New Roman" panose="02020603050405020304" pitchFamily="18" charset="0"/>
+                <a:cs typeface="Times New Roman" panose="02020603050405020304" pitchFamily="18" charset="0"/>
+              </a:rPr>
+              <a:t>df.</a:t>
+            </a:r>
+            <a:r>
+              <a:rPr lang="pt-BR" sz="1800" b="1" dirty="0" err="1">
+                <a:latin typeface="Times New Roman" panose="02020603050405020304" pitchFamily="18" charset="0"/>
+                <a:cs typeface="Times New Roman" panose="02020603050405020304" pitchFamily="18" charset="0"/>
+              </a:rPr>
+              <a:t>head</a:t>
+            </a:r>
+            <a:r>
+              <a:rPr lang="pt-BR" sz="1800" dirty="0">
+                <a:latin typeface="Times New Roman" panose="02020603050405020304" pitchFamily="18" charset="0"/>
+                <a:cs typeface="Times New Roman" panose="02020603050405020304" pitchFamily="18" charset="0"/>
+              </a:rPr>
+              <a:t>() # 5 primeiras linhas do </a:t>
+            </a:r>
+            <a:r>
+              <a:rPr lang="pt-BR" sz="1800" dirty="0" err="1">
+                <a:latin typeface="Times New Roman" panose="02020603050405020304" pitchFamily="18" charset="0"/>
+                <a:cs typeface="Times New Roman" panose="02020603050405020304" pitchFamily="18" charset="0"/>
+              </a:rPr>
+              <a:t>arq</a:t>
+            </a:r>
+            <a:r>
+              <a:rPr lang="pt-BR" sz="1800" dirty="0">
+                <a:latin typeface="Times New Roman" panose="02020603050405020304" pitchFamily="18" charset="0"/>
+                <a:cs typeface="Times New Roman" panose="02020603050405020304" pitchFamily="18" charset="0"/>
+              </a:rPr>
+              <a:t> ou </a:t>
+            </a:r>
+            <a:r>
+              <a:rPr lang="pt-BR" sz="1800" dirty="0" err="1">
+                <a:latin typeface="Times New Roman" panose="02020603050405020304" pitchFamily="18" charset="0"/>
+                <a:cs typeface="Times New Roman" panose="02020603050405020304" pitchFamily="18" charset="0"/>
+              </a:rPr>
+              <a:t>df.</a:t>
+            </a:r>
+            <a:r>
+              <a:rPr lang="pt-BR" sz="1800" b="1" dirty="0" err="1">
+                <a:latin typeface="Times New Roman" panose="02020603050405020304" pitchFamily="18" charset="0"/>
+                <a:cs typeface="Times New Roman" panose="02020603050405020304" pitchFamily="18" charset="0"/>
+              </a:rPr>
+              <a:t>tail</a:t>
+            </a:r>
+            <a:r>
+              <a:rPr lang="pt-BR" sz="1800" b="1" dirty="0">
+                <a:latin typeface="Times New Roman" panose="02020603050405020304" pitchFamily="18" charset="0"/>
+                <a:cs typeface="Times New Roman" panose="02020603050405020304" pitchFamily="18" charset="0"/>
+              </a:rPr>
+              <a:t>() - </a:t>
+            </a:r>
+            <a:r>
+              <a:rPr lang="pt-BR" sz="1800" dirty="0">
+                <a:latin typeface="Times New Roman" panose="02020603050405020304" pitchFamily="18" charset="0"/>
+                <a:cs typeface="Times New Roman" panose="02020603050405020304" pitchFamily="18" charset="0"/>
+              </a:rPr>
+              <a:t>05 ult.</a:t>
+            </a:r>
+          </a:p>
+          <a:p>
+            <a:pPr marL="0" indent="0" algn="just">
+              <a:buNone/>
+            </a:pPr>
+            <a:r>
+              <a:rPr lang="pt-BR" sz="1800" dirty="0" err="1">
+                <a:latin typeface="Times New Roman" panose="02020603050405020304" pitchFamily="18" charset="0"/>
+                <a:cs typeface="Times New Roman" panose="02020603050405020304" pitchFamily="18" charset="0"/>
+              </a:rPr>
+              <a:t>df.c</a:t>
+            </a:r>
+            <a:r>
+              <a:rPr lang="pt-BR" sz="1800" b="1" dirty="0" err="1">
+                <a:latin typeface="Times New Roman" panose="02020603050405020304" pitchFamily="18" charset="0"/>
+                <a:cs typeface="Times New Roman" panose="02020603050405020304" pitchFamily="18" charset="0"/>
+              </a:rPr>
+              <a:t>ount</a:t>
+            </a:r>
+            <a:r>
+              <a:rPr lang="pt-BR" sz="1800" b="1" dirty="0">
+                <a:latin typeface="Times New Roman" panose="02020603050405020304" pitchFamily="18" charset="0"/>
+                <a:cs typeface="Times New Roman" panose="02020603050405020304" pitchFamily="18" charset="0"/>
+              </a:rPr>
+              <a:t>()</a:t>
+            </a:r>
+            <a:r>
+              <a:rPr lang="pt-BR" sz="1800" dirty="0">
+                <a:latin typeface="Times New Roman" panose="02020603050405020304" pitchFamily="18" charset="0"/>
+                <a:cs typeface="Times New Roman" panose="02020603050405020304" pitchFamily="18" charset="0"/>
+              </a:rPr>
+              <a:t> # </a:t>
+            </a:r>
+            <a:r>
+              <a:rPr lang="pt-BR" sz="1800" dirty="0" err="1">
+                <a:latin typeface="Times New Roman" panose="02020603050405020304" pitchFamily="18" charset="0"/>
+                <a:cs typeface="Times New Roman" panose="02020603050405020304" pitchFamily="18" charset="0"/>
+              </a:rPr>
+              <a:t>df.</a:t>
+            </a:r>
+            <a:r>
+              <a:rPr lang="pt-BR" sz="1800" b="1" dirty="0" err="1">
+                <a:latin typeface="Times New Roman" panose="02020603050405020304" pitchFamily="18" charset="0"/>
+                <a:cs typeface="Times New Roman" panose="02020603050405020304" pitchFamily="18" charset="0"/>
+              </a:rPr>
+              <a:t>describe</a:t>
+            </a:r>
+            <a:r>
+              <a:rPr lang="pt-BR" sz="1800" b="1" dirty="0">
+                <a:latin typeface="Times New Roman" panose="02020603050405020304" pitchFamily="18" charset="0"/>
+                <a:cs typeface="Times New Roman" panose="02020603050405020304" pitchFamily="18" charset="0"/>
+              </a:rPr>
+              <a:t>(), </a:t>
+            </a:r>
+            <a:r>
+              <a:rPr lang="pt-BR" sz="1800" b="1" dirty="0" err="1">
+                <a:latin typeface="Times New Roman" panose="02020603050405020304" pitchFamily="18" charset="0"/>
+                <a:cs typeface="Times New Roman" panose="02020603050405020304" pitchFamily="18" charset="0"/>
+              </a:rPr>
+              <a:t>df.dtypes</a:t>
+            </a:r>
+            <a:endParaRPr lang="pt-BR" sz="1800" b="1" dirty="0">
+              <a:latin typeface="Times New Roman" panose="02020603050405020304" pitchFamily="18" charset="0"/>
+              <a:cs typeface="Times New Roman" panose="02020603050405020304" pitchFamily="18" charset="0"/>
+            </a:endParaRPr>
+          </a:p>
+          <a:p>
+            <a:pPr marL="0" indent="0" algn="just">
+              <a:buNone/>
+            </a:pPr>
+            <a:r>
+              <a:rPr lang="pt-BR" sz="1800" dirty="0" err="1">
+                <a:latin typeface="Times New Roman" panose="02020603050405020304" pitchFamily="18" charset="0"/>
+                <a:cs typeface="Times New Roman" panose="02020603050405020304" pitchFamily="18" charset="0"/>
+              </a:rPr>
+              <a:t>df</a:t>
+            </a:r>
+            <a:r>
+              <a:rPr lang="pt-BR" sz="1800" dirty="0">
+                <a:latin typeface="Times New Roman" panose="02020603050405020304" pitchFamily="18" charset="0"/>
+                <a:cs typeface="Times New Roman" panose="02020603050405020304" pitchFamily="18" charset="0"/>
+              </a:rPr>
+              <a:t>['</a:t>
+            </a:r>
+            <a:r>
+              <a:rPr lang="pt-BR" sz="1800" dirty="0" err="1">
+                <a:latin typeface="Times New Roman" panose="02020603050405020304" pitchFamily="18" charset="0"/>
+                <a:cs typeface="Times New Roman" panose="02020603050405020304" pitchFamily="18" charset="0"/>
+              </a:rPr>
+              <a:t>sigla_uf_unidade_ensino</a:t>
+            </a:r>
+            <a:r>
+              <a:rPr lang="pt-BR" sz="1800" dirty="0">
+                <a:latin typeface="Times New Roman" panose="02020603050405020304" pitchFamily="18" charset="0"/>
+                <a:cs typeface="Times New Roman" panose="02020603050405020304" pitchFamily="18" charset="0"/>
+              </a:rPr>
+              <a:t>'].</a:t>
+            </a:r>
+            <a:r>
+              <a:rPr lang="pt-BR" sz="1800" b="1" dirty="0" err="1">
+                <a:latin typeface="Times New Roman" panose="02020603050405020304" pitchFamily="18" charset="0"/>
+                <a:cs typeface="Times New Roman" panose="02020603050405020304" pitchFamily="18" charset="0"/>
+              </a:rPr>
+              <a:t>value_counts</a:t>
+            </a:r>
+            <a:r>
+              <a:rPr lang="pt-BR" sz="1800" dirty="0">
+                <a:latin typeface="Times New Roman" panose="02020603050405020304" pitchFamily="18" charset="0"/>
+                <a:cs typeface="Times New Roman" panose="02020603050405020304" pitchFamily="18" charset="0"/>
+              </a:rPr>
+              <a:t>() # atributos em colchetes</a:t>
+            </a:r>
+          </a:p>
+          <a:p>
+            <a:pPr marL="0" indent="0" algn="just">
+              <a:buNone/>
+            </a:pPr>
+            <a:r>
+              <a:rPr lang="pt-BR" sz="1800" dirty="0">
+                <a:latin typeface="Times New Roman" panose="02020603050405020304" pitchFamily="18" charset="0"/>
+                <a:cs typeface="Times New Roman" panose="02020603050405020304" pitchFamily="18" charset="0"/>
+              </a:rPr>
+              <a:t>%</a:t>
+            </a:r>
+            <a:r>
+              <a:rPr lang="pt-BR" sz="1800" b="1" dirty="0" err="1">
+                <a:latin typeface="Times New Roman" panose="02020603050405020304" pitchFamily="18" charset="0"/>
+                <a:cs typeface="Times New Roman" panose="02020603050405020304" pitchFamily="18" charset="0"/>
+              </a:rPr>
+              <a:t>matplotlib</a:t>
+            </a:r>
+            <a:r>
+              <a:rPr lang="pt-BR" sz="1800" dirty="0">
+                <a:latin typeface="Times New Roman" panose="02020603050405020304" pitchFamily="18" charset="0"/>
+                <a:cs typeface="Times New Roman" panose="02020603050405020304" pitchFamily="18" charset="0"/>
+              </a:rPr>
+              <a:t> </a:t>
+            </a:r>
+            <a:r>
+              <a:rPr lang="pt-BR" sz="1800" b="1" dirty="0" err="1">
+                <a:latin typeface="Times New Roman" panose="02020603050405020304" pitchFamily="18" charset="0"/>
+                <a:cs typeface="Times New Roman" panose="02020603050405020304" pitchFamily="18" charset="0"/>
+              </a:rPr>
+              <a:t>inline</a:t>
+            </a:r>
+            <a:endParaRPr lang="pt-BR" sz="1800" b="1" dirty="0">
+              <a:latin typeface="Times New Roman" panose="02020603050405020304" pitchFamily="18" charset="0"/>
+              <a:cs typeface="Times New Roman" panose="02020603050405020304" pitchFamily="18" charset="0"/>
+            </a:endParaRPr>
+          </a:p>
+          <a:p>
+            <a:pPr marL="0" indent="0" algn="just">
+              <a:buNone/>
+            </a:pPr>
+            <a:r>
+              <a:rPr lang="pt-BR" sz="1800" dirty="0" err="1">
+                <a:latin typeface="Times New Roman" panose="02020603050405020304" pitchFamily="18" charset="0"/>
+                <a:cs typeface="Times New Roman" panose="02020603050405020304" pitchFamily="18" charset="0"/>
+              </a:rPr>
+              <a:t>df</a:t>
+            </a:r>
+            <a:r>
+              <a:rPr lang="pt-BR" sz="1800" dirty="0">
+                <a:latin typeface="Times New Roman" panose="02020603050405020304" pitchFamily="18" charset="0"/>
+                <a:cs typeface="Times New Roman" panose="02020603050405020304" pitchFamily="18" charset="0"/>
+              </a:rPr>
+              <a:t>['</a:t>
+            </a:r>
+            <a:r>
+              <a:rPr lang="pt-BR" sz="1800" dirty="0" err="1">
+                <a:latin typeface="Times New Roman" panose="02020603050405020304" pitchFamily="18" charset="0"/>
+                <a:cs typeface="Times New Roman" panose="02020603050405020304" pitchFamily="18" charset="0"/>
+              </a:rPr>
+              <a:t>sigla_uf_unidade_ensino</a:t>
+            </a:r>
+            <a:r>
+              <a:rPr lang="pt-BR" sz="1800" dirty="0">
+                <a:latin typeface="Times New Roman" panose="02020603050405020304" pitchFamily="18" charset="0"/>
+                <a:cs typeface="Times New Roman" panose="02020603050405020304" pitchFamily="18" charset="0"/>
+              </a:rPr>
+              <a:t>'].</a:t>
+            </a:r>
+            <a:r>
+              <a:rPr lang="pt-BR" sz="1800" b="1" dirty="0" err="1">
+                <a:latin typeface="Times New Roman" panose="02020603050405020304" pitchFamily="18" charset="0"/>
+                <a:cs typeface="Times New Roman" panose="02020603050405020304" pitchFamily="18" charset="0"/>
+              </a:rPr>
+              <a:t>value_counts</a:t>
+            </a:r>
+            <a:r>
+              <a:rPr lang="pt-BR" sz="1800" dirty="0">
+                <a:latin typeface="Times New Roman" panose="02020603050405020304" pitchFamily="18" charset="0"/>
+                <a:cs typeface="Times New Roman" panose="02020603050405020304" pitchFamily="18" charset="0"/>
+              </a:rPr>
+              <a:t>().</a:t>
+            </a:r>
+            <a:r>
+              <a:rPr lang="pt-BR" sz="1800" b="1" dirty="0" err="1">
+                <a:latin typeface="Times New Roman" panose="02020603050405020304" pitchFamily="18" charset="0"/>
+                <a:cs typeface="Times New Roman" panose="02020603050405020304" pitchFamily="18" charset="0"/>
+              </a:rPr>
+              <a:t>plot</a:t>
+            </a:r>
+            <a:r>
+              <a:rPr lang="pt-BR" sz="1800" dirty="0" err="1">
+                <a:latin typeface="Times New Roman" panose="02020603050405020304" pitchFamily="18" charset="0"/>
+                <a:cs typeface="Times New Roman" panose="02020603050405020304" pitchFamily="18" charset="0"/>
+              </a:rPr>
+              <a:t>.</a:t>
+            </a:r>
+            <a:r>
+              <a:rPr lang="pt-BR" sz="1800" b="1" dirty="0" err="1">
+                <a:latin typeface="Times New Roman" panose="02020603050405020304" pitchFamily="18" charset="0"/>
+                <a:cs typeface="Times New Roman" panose="02020603050405020304" pitchFamily="18" charset="0"/>
+              </a:rPr>
+              <a:t>bar</a:t>
+            </a:r>
+            <a:r>
+              <a:rPr lang="pt-BR" sz="1800" dirty="0">
+                <a:latin typeface="Times New Roman" panose="02020603050405020304" pitchFamily="18" charset="0"/>
+                <a:cs typeface="Times New Roman" panose="02020603050405020304" pitchFamily="18" charset="0"/>
+              </a:rPr>
+              <a:t>()</a:t>
+            </a:r>
+          </a:p>
+        </p:txBody>
+      </p:sp>
+    </p:spTree>
+    <p:extLst>
+      <p:ext uri="{BB962C8B-B14F-4D97-AF65-F5344CB8AC3E}">
+        <p14:creationId xmlns:p14="http://schemas.microsoft.com/office/powerpoint/2010/main" val="2475896952"/>
+      </p:ext>
+    </p:extLst>
+  </p:cSld>
+  <p:clrMapOvr>
+    <a:masterClrMapping/>
+  </p:clrMapOvr>
+  <p:transition spd="med"/>
+</p:sld>
+</file>
+
+<file path=ppt/slides/slide22.xml><?xml version="1.0" encoding="utf-8"?>
+<p:sld xmlns:a="http://schemas.openxmlformats.org/drawingml/2006/main" xmlns:r="http://schemas.openxmlformats.org/officeDocument/2006/relationships" xmlns:p="http://schemas.openxmlformats.org/presentationml/2006/main">
+  <p:cSld>
+    <p:spTree>
+      <p:nvGrpSpPr>
+        <p:cNvPr id="1" name=""/>
+        <p:cNvGrpSpPr/>
+        <p:nvPr/>
+      </p:nvGrpSpPr>
+      <p:grpSpPr>
+        <a:xfrm>
+          <a:off x="0" y="0"/>
+          <a:ext cx="0" cy="0"/>
+          <a:chOff x="0" y="0"/>
+          <a:chExt cx="0" cy="0"/>
+        </a:xfrm>
+      </p:grpSpPr>
+      <p:sp>
+        <p:nvSpPr>
+          <p:cNvPr id="6" name="Title 1"/>
+          <p:cNvSpPr>
+            <a:spLocks noGrp="1"/>
+          </p:cNvSpPr>
+          <p:nvPr>
+            <p:ph type="title"/>
+          </p:nvPr>
+        </p:nvSpPr>
+        <p:spPr>
+          <a:xfrm>
+            <a:off x="457200" y="205980"/>
+            <a:ext cx="8229600" cy="857251"/>
+          </a:xfrm>
+        </p:spPr>
+        <p:txBody>
+          <a:bodyPr>
+            <a:normAutofit/>
+          </a:bodyPr>
+          <a:lstStyle/>
+          <a:p>
+            <a:r>
+              <a:rPr lang="en-US" b="1" dirty="0">
+                <a:solidFill>
+                  <a:srgbClr val="0070C0"/>
+                </a:solidFill>
+              </a:rPr>
+              <a:t>Outros </a:t>
+            </a:r>
+            <a:r>
+              <a:rPr lang="en-US" b="1" dirty="0" err="1">
+                <a:solidFill>
+                  <a:srgbClr val="0070C0"/>
+                </a:solidFill>
+              </a:rPr>
+              <a:t>Dinâmica</a:t>
+            </a:r>
+            <a:r>
+              <a:rPr lang="en-US" b="1" dirty="0">
+                <a:solidFill>
+                  <a:srgbClr val="0070C0"/>
+                </a:solidFill>
+              </a:rPr>
+              <a:t>/</a:t>
+            </a:r>
+            <a:r>
+              <a:rPr lang="en-US" b="1" dirty="0" err="1">
+                <a:solidFill>
+                  <a:srgbClr val="0070C0"/>
+                </a:solidFill>
+              </a:rPr>
+              <a:t>Atividades</a:t>
+            </a:r>
+            <a:endParaRPr lang="en-US" b="1" dirty="0">
+              <a:solidFill>
+                <a:srgbClr val="0070C0"/>
+              </a:solidFill>
+            </a:endParaRPr>
+          </a:p>
+        </p:txBody>
+      </p:sp>
+      <p:sp>
+        <p:nvSpPr>
+          <p:cNvPr id="8" name="Text Placeholder 2"/>
+          <p:cNvSpPr>
+            <a:spLocks noGrp="1"/>
+          </p:cNvSpPr>
+          <p:nvPr>
+            <p:ph type="body" sz="half" idx="1"/>
+          </p:nvPr>
+        </p:nvSpPr>
+        <p:spPr>
+          <a:xfrm>
+            <a:off x="139472" y="1063230"/>
+            <a:ext cx="8865056" cy="3874290"/>
+          </a:xfrm>
+        </p:spPr>
+        <p:txBody>
+          <a:bodyPr>
+            <a:noAutofit/>
+          </a:bodyPr>
+          <a:lstStyle/>
+          <a:p>
+            <a:pPr marL="0" indent="0" algn="just">
+              <a:buNone/>
+            </a:pPr>
+            <a:endParaRPr lang="pt-BR" sz="1800" dirty="0">
+              <a:latin typeface="Times New Roman" panose="02020603050405020304" pitchFamily="18" charset="0"/>
+              <a:cs typeface="Times New Roman" panose="02020603050405020304" pitchFamily="18" charset="0"/>
+            </a:endParaRPr>
+          </a:p>
+          <a:p>
+            <a:pPr marL="0" indent="0" algn="just">
+              <a:buNone/>
+            </a:pPr>
+            <a:endParaRPr lang="pt-BR" sz="1800" dirty="0">
+              <a:latin typeface="Times New Roman" panose="02020603050405020304" pitchFamily="18" charset="0"/>
+              <a:cs typeface="Times New Roman" panose="02020603050405020304" pitchFamily="18" charset="0"/>
+            </a:endParaRPr>
+          </a:p>
+          <a:p>
+            <a:pPr marL="0" indent="0" algn="just">
+              <a:buNone/>
+            </a:pPr>
+            <a:endParaRPr lang="pt-BR" sz="1800" dirty="0">
+              <a:latin typeface="Times New Roman" panose="02020603050405020304" pitchFamily="18" charset="0"/>
+              <a:cs typeface="Times New Roman" panose="02020603050405020304" pitchFamily="18" charset="0"/>
+            </a:endParaRPr>
+          </a:p>
+          <a:p>
+            <a:pPr marL="0" indent="0" algn="just">
+              <a:buNone/>
+            </a:pPr>
+            <a:endParaRPr lang="pt-BR" sz="1800" dirty="0">
+              <a:latin typeface="Times New Roman" panose="02020603050405020304" pitchFamily="18" charset="0"/>
+              <a:cs typeface="Times New Roman" panose="02020603050405020304" pitchFamily="18" charset="0"/>
+            </a:endParaRPr>
+          </a:p>
+          <a:p>
+            <a:pPr marL="0" indent="0" algn="just">
+              <a:buNone/>
+            </a:pPr>
+            <a:r>
+              <a:rPr lang="pt-BR" sz="1800" dirty="0">
+                <a:latin typeface="Times New Roman" panose="02020603050405020304" pitchFamily="18" charset="0"/>
+                <a:cs typeface="Times New Roman" panose="02020603050405020304" pitchFamily="18" charset="0"/>
+              </a:rPr>
+              <a:t>	</a:t>
+            </a:r>
+            <a:r>
+              <a:rPr lang="pt-BR" sz="1800" dirty="0">
+                <a:latin typeface="Times New Roman" panose="02020603050405020304" pitchFamily="18" charset="0"/>
+                <a:cs typeface="Times New Roman" panose="02020603050405020304" pitchFamily="18" charset="0"/>
+                <a:hlinkClick r:id="rId3"/>
+              </a:rPr>
+              <a:t>https://www.e-setorial.com.br/blog/229-170-projetos-de-data-science-e-machine-learning-com-python-resolvidos-e-explicados</a:t>
+            </a:r>
+            <a:endParaRPr lang="pt-BR" sz="1800" dirty="0">
+              <a:latin typeface="Times New Roman" panose="02020603050405020304" pitchFamily="18" charset="0"/>
+              <a:cs typeface="Times New Roman" panose="02020603050405020304" pitchFamily="18" charset="0"/>
+            </a:endParaRPr>
+          </a:p>
+        </p:txBody>
+      </p:sp>
+    </p:spTree>
+    <p:extLst>
+      <p:ext uri="{BB962C8B-B14F-4D97-AF65-F5344CB8AC3E}">
+        <p14:creationId xmlns:p14="http://schemas.microsoft.com/office/powerpoint/2010/main" val="2876867365"/>
+      </p:ext>
+    </p:extLst>
+  </p:cSld>
+  <p:clrMapOvr>
+    <a:masterClrMapping/>
+  </p:clrMapOvr>
+  <p:transition spd="med"/>
+</p:sld>
+</file>
+
+<file path=ppt/slides/slide23.xml><?xml version="1.0" encoding="utf-8"?>
+<p:sld xmlns:a="http://schemas.openxmlformats.org/drawingml/2006/main" xmlns:r="http://schemas.openxmlformats.org/officeDocument/2006/relationships" xmlns:p="http://schemas.openxmlformats.org/presentationml/2006/main">
+  <p:cSld>
+    <p:spTree>
+      <p:nvGrpSpPr>
+        <p:cNvPr id="1" name=""/>
+        <p:cNvGrpSpPr/>
+        <p:nvPr/>
+      </p:nvGrpSpPr>
+      <p:grpSpPr>
+        <a:xfrm>
+          <a:off x="0" y="0"/>
+          <a:ext cx="0" cy="0"/>
+          <a:chOff x="0" y="0"/>
+          <a:chExt cx="0" cy="0"/>
+        </a:xfrm>
+      </p:grpSpPr>
+      <p:sp>
+        <p:nvSpPr>
+          <p:cNvPr id="6" name="Title 1"/>
+          <p:cNvSpPr>
+            <a:spLocks noGrp="1"/>
+          </p:cNvSpPr>
+          <p:nvPr>
+            <p:ph type="title"/>
+          </p:nvPr>
+        </p:nvSpPr>
+        <p:spPr>
+          <a:xfrm>
+            <a:off x="457200" y="205980"/>
+            <a:ext cx="8229600" cy="857251"/>
+          </a:xfrm>
+        </p:spPr>
+        <p:txBody>
+          <a:bodyPr>
+            <a:normAutofit/>
+          </a:bodyPr>
+          <a:lstStyle/>
+          <a:p>
+            <a:r>
+              <a:rPr lang="en-US" b="1" dirty="0" err="1">
+                <a:solidFill>
+                  <a:srgbClr val="0070C0"/>
+                </a:solidFill>
+              </a:rPr>
               <a:t>Referências</a:t>
             </a:r>
             <a:r>
@@ -8611,7 +10022,7 @@
 </p:sld>
 </file>
 
-<file path=ppt/slides/slide21.xml><?xml version="1.0" encoding="utf-8"?>
+<file path=ppt/slides/slide24.xml><?xml version="1.0" encoding="utf-8"?>
 <p:sld xmlns:a="http://schemas.openxmlformats.org/drawingml/2006/main" xmlns:r="http://schemas.openxmlformats.org/officeDocument/2006/relationships" xmlns:p="http://schemas.openxmlformats.org/presentationml/2006/main">
   <p:cSld>
     <p:spTree>

</xml_diff>